<commit_message>
Neuste Version der Präsentation meiner Wochenergebnisse
</commit_message>
<xml_diff>
--- a/2021-08-03_Präsentaion_meiner_Wochenergebnisse.pptx
+++ b/2021-08-03_Präsentaion_meiner_Wochenergebnisse.pptx
@@ -5,23 +5,18 @@
     <p:sldMasterId id="2147483660" r:id="rId1"/>
   </p:sldMasterIdLst>
   <p:notesMasterIdLst>
-    <p:notesMasterId r:id="rId16"/>
+    <p:notesMasterId r:id="rId11"/>
   </p:notesMasterIdLst>
   <p:sldIdLst>
     <p:sldId id="289" r:id="rId2"/>
     <p:sldId id="291" r:id="rId3"/>
-    <p:sldId id="319" r:id="rId4"/>
-    <p:sldId id="339" r:id="rId5"/>
-    <p:sldId id="340" r:id="rId6"/>
-    <p:sldId id="341" r:id="rId7"/>
-    <p:sldId id="342" r:id="rId8"/>
-    <p:sldId id="349" r:id="rId9"/>
-    <p:sldId id="343" r:id="rId10"/>
-    <p:sldId id="347" r:id="rId11"/>
-    <p:sldId id="346" r:id="rId12"/>
-    <p:sldId id="344" r:id="rId13"/>
-    <p:sldId id="348" r:id="rId14"/>
-    <p:sldId id="345" r:id="rId15"/>
+    <p:sldId id="340" r:id="rId4"/>
+    <p:sldId id="341" r:id="rId5"/>
+    <p:sldId id="342" r:id="rId6"/>
+    <p:sldId id="349" r:id="rId7"/>
+    <p:sldId id="346" r:id="rId8"/>
+    <p:sldId id="348" r:id="rId9"/>
+    <p:sldId id="345" r:id="rId10"/>
   </p:sldIdLst>
   <p:sldSz cx="9144000" cy="5143500" type="screen16x9"/>
   <p:notesSz cx="6858000" cy="9144000"/>
@@ -20294,7 +20289,174 @@
 </p:sld>
 </file>
 
-<file path=ppt/slides/slide10.xml><?xml version="1.0" encoding="utf-8"?>
+<file path=ppt/slides/slide2.xml><?xml version="1.0" encoding="utf-8"?>
+<p:sld xmlns:a="http://schemas.openxmlformats.org/drawingml/2006/main" xmlns:r="http://schemas.openxmlformats.org/officeDocument/2006/relationships" xmlns:p="http://schemas.openxmlformats.org/presentationml/2006/main">
+  <p:cSld>
+    <p:spTree>
+      <p:nvGrpSpPr>
+        <p:cNvPr id="1" name=""/>
+        <p:cNvGrpSpPr/>
+        <p:nvPr/>
+      </p:nvGrpSpPr>
+      <p:grpSpPr>
+        <a:xfrm>
+          <a:off x="0" y="0"/>
+          <a:ext cx="0" cy="0"/>
+          <a:chOff x="0" y="0"/>
+          <a:chExt cx="0" cy="0"/>
+        </a:xfrm>
+      </p:grpSpPr>
+      <p:sp>
+        <p:nvSpPr>
+          <p:cNvPr id="2" name="Titel 1"/>
+          <p:cNvSpPr>
+            <a:spLocks noGrp="1"/>
+          </p:cNvSpPr>
+          <p:nvPr>
+            <p:ph type="title"/>
+          </p:nvPr>
+        </p:nvSpPr>
+        <p:spPr>
+          <a:xfrm>
+            <a:off x="628650" y="277630"/>
+            <a:ext cx="7902197" cy="521262"/>
+          </a:xfrm>
+        </p:spPr>
+        <p:txBody>
+          <a:bodyPr/>
+          <a:lstStyle/>
+          <a:p>
+            <a:r>
+              <a:rPr lang="de-DE" b="1" dirty="0" smtClean="0">
+                <a:latin typeface="Roboto" charset="0"/>
+                <a:ea typeface="Roboto" charset="0"/>
+                <a:cs typeface="Roboto" charset="0"/>
+              </a:rPr>
+              <a:t>Agenda</a:t>
+            </a:r>
+            <a:endParaRPr lang="de-DE" b="1" dirty="0">
+              <a:latin typeface="Roboto" charset="0"/>
+              <a:ea typeface="Roboto" charset="0"/>
+              <a:cs typeface="Roboto" charset="0"/>
+            </a:endParaRPr>
+          </a:p>
+        </p:txBody>
+      </p:sp>
+      <p:sp>
+        <p:nvSpPr>
+          <p:cNvPr id="4" name="Datumsplatzhalter 3"/>
+          <p:cNvSpPr>
+            <a:spLocks noGrp="1"/>
+          </p:cNvSpPr>
+          <p:nvPr>
+            <p:ph type="dt" sz="half" idx="10"/>
+          </p:nvPr>
+        </p:nvSpPr>
+        <p:spPr/>
+        <p:txBody>
+          <a:bodyPr/>
+          <a:lstStyle/>
+          <a:p>
+            <a:fld id="{B5753BF5-1BC6-4AD4-9648-6EA401ACBEDB}" type="datetime4">
+              <a:rPr lang="en-US" smtClean="0"/>
+              <a:t>August 6, 2021</a:t>
+            </a:fld>
+            <a:endParaRPr lang="de-DE" dirty="0"/>
+          </a:p>
+        </p:txBody>
+      </p:sp>
+      <p:sp>
+        <p:nvSpPr>
+          <p:cNvPr id="5" name="Fußzeilenplatzhalter 4"/>
+          <p:cNvSpPr>
+            <a:spLocks noGrp="1"/>
+          </p:cNvSpPr>
+          <p:nvPr>
+            <p:ph type="ftr" sz="quarter" idx="11"/>
+          </p:nvPr>
+        </p:nvSpPr>
+        <p:spPr/>
+        <p:txBody>
+          <a:bodyPr/>
+          <a:lstStyle/>
+          <a:p>
+            <a:r>
+              <a:rPr lang="de-DE" smtClean="0"/>
+              <a:t>Reiner Lemoine Institut</a:t>
+            </a:r>
+            <a:endParaRPr lang="de-DE" dirty="0"/>
+          </a:p>
+        </p:txBody>
+      </p:sp>
+      <p:sp>
+        <p:nvSpPr>
+          <p:cNvPr id="6" name="Foliennummernplatzhalter 5"/>
+          <p:cNvSpPr>
+            <a:spLocks noGrp="1"/>
+          </p:cNvSpPr>
+          <p:nvPr>
+            <p:ph type="sldNum" sz="quarter" idx="12"/>
+          </p:nvPr>
+        </p:nvSpPr>
+        <p:spPr/>
+        <p:txBody>
+          <a:bodyPr/>
+          <a:lstStyle/>
+          <a:p>
+            <a:fld id="{C2A96E4E-EC3F-424D-8211-F17AF9FC0446}" type="slidenum">
+              <a:rPr lang="de-DE" smtClean="0"/>
+              <a:pPr/>
+              <a:t>1</a:t>
+            </a:fld>
+            <a:endParaRPr lang="de-DE" dirty="0"/>
+          </a:p>
+        </p:txBody>
+      </p:sp>
+      <p:graphicFrame>
+        <p:nvGraphicFramePr>
+          <p:cNvPr id="7" name="Diagram 3"/>
+          <p:cNvGraphicFramePr>
+            <a:graphicFrameLocks/>
+          </p:cNvGraphicFramePr>
+          <p:nvPr>
+            <p:extLst>
+              <p:ext uri="{D42A27DB-BD31-4B8C-83A1-F6EECF244321}">
+                <p14:modId xmlns:p14="http://schemas.microsoft.com/office/powerpoint/2010/main" val="2923649328"/>
+              </p:ext>
+            </p:extLst>
+          </p:nvPr>
+        </p:nvGraphicFramePr>
+        <p:xfrm>
+          <a:off x="628650" y="979714"/>
+          <a:ext cx="8134350" cy="3744686"/>
+        </p:xfrm>
+        <a:graphic>
+          <a:graphicData uri="http://schemas.openxmlformats.org/drawingml/2006/diagram">
+            <dgm:relIds xmlns:dgm="http://schemas.openxmlformats.org/drawingml/2006/diagram" xmlns:r="http://schemas.openxmlformats.org/officeDocument/2006/relationships" r:dm="rId2" r:lo="rId3" r:qs="rId4" r:cs="rId5"/>
+          </a:graphicData>
+        </a:graphic>
+      </p:graphicFrame>
+    </p:spTree>
+    <p:extLst>
+      <p:ext uri="{BB962C8B-B14F-4D97-AF65-F5344CB8AC3E}">
+        <p14:creationId xmlns:p14="http://schemas.microsoft.com/office/powerpoint/2010/main" val="19975182"/>
+      </p:ext>
+    </p:extLst>
+  </p:cSld>
+  <p:clrMapOvr>
+    <a:masterClrMapping/>
+  </p:clrMapOvr>
+  <p:timing>
+    <p:tnLst>
+      <p:par>
+        <p:cTn id="1" dur="indefinite" restart="never" nodeType="tmRoot"/>
+      </p:par>
+    </p:tnLst>
+  </p:timing>
+</p:sld>
+</file>
+
+<file path=ppt/slides/slide3.xml><?xml version="1.0" encoding="utf-8"?>
 <p:sld xmlns:a="http://schemas.openxmlformats.org/drawingml/2006/main" xmlns:r="http://schemas.openxmlformats.org/officeDocument/2006/relationships" xmlns:p="http://schemas.openxmlformats.org/presentationml/2006/main">
   <p:cSld>
     <p:spTree>
@@ -20328,63 +20490,20 @@
           </a:bodyPr>
           <a:lstStyle/>
           <a:p>
-            <a:pPr>
-              <a:lnSpc>
-                <a:spcPct val="110000"/>
-              </a:lnSpc>
-            </a:pPr>
-            <a:r>
-              <a:rPr lang="en-US" dirty="0" smtClean="0">
-                <a:latin typeface="Roboto Light" panose="02000000000000000000" pitchFamily="2" charset="0"/>
-                <a:ea typeface="Roboto Light" panose="02000000000000000000" pitchFamily="2" charset="0"/>
-                <a:cs typeface="Roboto Light" panose="02000000000000000000" pitchFamily="2" charset="0"/>
-              </a:rPr>
-              <a:t>Command Line</a:t>
-            </a:r>
-          </a:p>
-          <a:p>
-            <a:pPr>
-              <a:lnSpc>
-                <a:spcPct val="110000"/>
-              </a:lnSpc>
-            </a:pPr>
-            <a:r>
-              <a:rPr lang="en-US" dirty="0" smtClean="0">
-                <a:latin typeface="Roboto Light" panose="02000000000000000000" pitchFamily="2" charset="0"/>
-                <a:ea typeface="Roboto Light" panose="02000000000000000000" pitchFamily="2" charset="0"/>
-                <a:cs typeface="Roboto Light" panose="02000000000000000000" pitchFamily="2" charset="0"/>
-              </a:rPr>
-              <a:t>Virtual </a:t>
-            </a:r>
-            <a:r>
-              <a:rPr lang="en-US" dirty="0" err="1" smtClean="0">
-                <a:latin typeface="Roboto Light" panose="02000000000000000000" pitchFamily="2" charset="0"/>
-                <a:ea typeface="Roboto Light" panose="02000000000000000000" pitchFamily="2" charset="0"/>
-                <a:cs typeface="Roboto Light" panose="02000000000000000000" pitchFamily="2" charset="0"/>
-              </a:rPr>
-              <a:t>Enviroment</a:t>
-            </a:r>
-            <a:r>
-              <a:rPr lang="en-US" b="1" dirty="0" smtClean="0">
-                <a:latin typeface="Roboto" panose="02000000000000000000" pitchFamily="2" charset="0"/>
-                <a:ea typeface="Roboto" panose="02000000000000000000" pitchFamily="2" charset="0"/>
-                <a:cs typeface="Roboto" panose="02000000000000000000" pitchFamily="2" charset="0"/>
-              </a:rPr>
-              <a:t> </a:t>
-            </a:r>
-          </a:p>
-          <a:p>
             <a:pPr marL="0" indent="0">
               <a:lnSpc>
                 <a:spcPct val="110000"/>
               </a:lnSpc>
               <a:buNone/>
             </a:pPr>
-            <a:endParaRPr lang="en-US" b="1" dirty="0" smtClean="0">
-              <a:latin typeface="Roboto" panose="02000000000000000000" pitchFamily="2" charset="0"/>
-              <a:ea typeface="Roboto" panose="02000000000000000000" pitchFamily="2" charset="0"/>
-              <a:cs typeface="Roboto" panose="02000000000000000000" pitchFamily="2" charset="0"/>
-            </a:endParaRPr>
+            <a:r>
+              <a:rPr lang="en-US" b="1" dirty="0" smtClean="0">
+                <a:latin typeface="Roboto" panose="02000000000000000000" pitchFamily="2" charset="0"/>
+                <a:ea typeface="Roboto" panose="02000000000000000000" pitchFamily="2" charset="0"/>
+                <a:cs typeface="Roboto" panose="02000000000000000000" pitchFamily="2" charset="0"/>
+              </a:rPr>
+              <a:t>           </a:t>
+            </a:r>
           </a:p>
           <a:p>
             <a:pPr marL="0" indent="0">
@@ -20393,7 +20512,15 @@
               </a:lnSpc>
               <a:buNone/>
             </a:pPr>
-            <a:endParaRPr lang="en-US" dirty="0">
+            <a:r>
+              <a:rPr lang="en-US" dirty="0" err="1" smtClean="0">
+                <a:latin typeface="+mn-lt"/>
+                <a:ea typeface="Roboto" panose="02000000000000000000" pitchFamily="2" charset="0"/>
+                <a:cs typeface="Roboto" panose="02000000000000000000" pitchFamily="2" charset="0"/>
+              </a:rPr>
+              <a:t>Begrüßung</a:t>
+            </a:r>
+            <a:endParaRPr lang="en-US" dirty="0" smtClean="0">
               <a:latin typeface="+mn-lt"/>
               <a:ea typeface="Roboto" panose="02000000000000000000" pitchFamily="2" charset="0"/>
               <a:cs typeface="Roboto" panose="02000000000000000000" pitchFamily="2" charset="0"/>
@@ -20406,14 +20533,82 @@
               </a:lnSpc>
               <a:buNone/>
             </a:pPr>
+            <a:endParaRPr lang="en-US" b="1" dirty="0">
+              <a:latin typeface="Roboto" panose="02000000000000000000" pitchFamily="2" charset="0"/>
+              <a:ea typeface="Roboto" panose="02000000000000000000" pitchFamily="2" charset="0"/>
+              <a:cs typeface="Roboto" panose="02000000000000000000" pitchFamily="2" charset="0"/>
+            </a:endParaRPr>
+          </a:p>
+          <a:p>
+            <a:pPr marL="0" indent="0">
+              <a:lnSpc>
+                <a:spcPct val="110000"/>
+              </a:lnSpc>
+              <a:buNone/>
+            </a:pPr>
             <a:r>
               <a:rPr lang="en-US" b="1" dirty="0" smtClean="0">
                 <a:latin typeface="Roboto" panose="02000000000000000000" pitchFamily="2" charset="0"/>
                 <a:ea typeface="Roboto" panose="02000000000000000000" pitchFamily="2" charset="0"/>
                 <a:cs typeface="Roboto" panose="02000000000000000000" pitchFamily="2" charset="0"/>
               </a:rPr>
-              <a:t>      </a:t>
-            </a:r>
+              <a:t>      				</a:t>
+            </a:r>
+            <a:r>
+              <a:rPr lang="en-US" dirty="0" err="1" smtClean="0">
+                <a:latin typeface="Roboto Light" panose="02000000000000000000" pitchFamily="2" charset="0"/>
+                <a:ea typeface="Roboto Light" panose="02000000000000000000" pitchFamily="2" charset="0"/>
+                <a:cs typeface="Roboto Light" panose="02000000000000000000" pitchFamily="2" charset="0"/>
+              </a:rPr>
+              <a:t>Checkliste</a:t>
+            </a:r>
+            <a:endParaRPr lang="en-US" dirty="0" smtClean="0">
+              <a:latin typeface="Roboto Light" panose="02000000000000000000" pitchFamily="2" charset="0"/>
+              <a:ea typeface="Roboto Light" panose="02000000000000000000" pitchFamily="2" charset="0"/>
+              <a:cs typeface="Roboto Light" panose="02000000000000000000" pitchFamily="2" charset="0"/>
+            </a:endParaRPr>
+          </a:p>
+          <a:p>
+            <a:pPr marL="0" indent="0">
+              <a:lnSpc>
+                <a:spcPct val="110000"/>
+              </a:lnSpc>
+              <a:buNone/>
+            </a:pPr>
+            <a:endParaRPr lang="en-US" b="1" dirty="0">
+              <a:latin typeface="Roboto" panose="02000000000000000000" pitchFamily="2" charset="0"/>
+              <a:ea typeface="Roboto" panose="02000000000000000000" pitchFamily="2" charset="0"/>
+              <a:cs typeface="Roboto" panose="02000000000000000000" pitchFamily="2" charset="0"/>
+            </a:endParaRPr>
+          </a:p>
+          <a:p>
+            <a:pPr marL="0" indent="0">
+              <a:lnSpc>
+                <a:spcPct val="110000"/>
+              </a:lnSpc>
+              <a:buNone/>
+            </a:pPr>
+            <a:r>
+              <a:rPr lang="en-US" b="1" dirty="0" smtClean="0">
+                <a:latin typeface="Roboto" panose="02000000000000000000" pitchFamily="2" charset="0"/>
+                <a:ea typeface="Roboto" panose="02000000000000000000" pitchFamily="2" charset="0"/>
+                <a:cs typeface="Roboto" panose="02000000000000000000" pitchFamily="2" charset="0"/>
+              </a:rPr>
+              <a:t>                            					    </a:t>
+            </a:r>
+            <a:r>
+              <a:rPr lang="en-US" dirty="0" err="1" smtClean="0">
+                <a:latin typeface="Roboto Light" panose="02000000000000000000" pitchFamily="2" charset="0"/>
+                <a:ea typeface="Roboto Light" panose="02000000000000000000" pitchFamily="2" charset="0"/>
+                <a:cs typeface="Roboto Light" panose="02000000000000000000" pitchFamily="2" charset="0"/>
+              </a:rPr>
+              <a:t>Tagebuch</a:t>
+            </a:r>
+            <a:endParaRPr lang="en-US" dirty="0">
+              <a:latin typeface="Roboto Light" panose="02000000000000000000" pitchFamily="2" charset="0"/>
+              <a:ea typeface="Roboto Light" panose="02000000000000000000" pitchFamily="2" charset="0"/>
+              <a:cs typeface="Roboto Light" panose="02000000000000000000" pitchFamily="2" charset="0"/>
+            </a:endParaRPr>
           </a:p>
         </p:txBody>
       </p:sp>
@@ -20481,7 +20676,7 @@
             <a:fld id="{C2A96E4E-EC3F-424D-8211-F17AF9FC0446}" type="slidenum">
               <a:rPr lang="de-DE" smtClean="0"/>
               <a:pPr/>
-              <a:t>9</a:t>
+              <a:t>2</a:t>
             </a:fld>
             <a:endParaRPr lang="de-DE" dirty="0"/>
           </a:p>
@@ -20504,30 +20699,125 @@
           <a:p>
             <a:r>
               <a:rPr lang="de-DE" dirty="0" smtClean="0"/>
-              <a:t>Programmieren</a:t>
+              <a:t>Einfindung</a:t>
             </a:r>
             <a:endParaRPr lang="de-DE" dirty="0"/>
           </a:p>
         </p:txBody>
       </p:sp>
+      <p:cxnSp>
+        <p:nvCxnSpPr>
+          <p:cNvPr id="8" name="Gerade Verbindung mit Pfeil 7"/>
+          <p:cNvCxnSpPr/>
+          <p:nvPr/>
+        </p:nvCxnSpPr>
+        <p:spPr>
+          <a:xfrm>
+            <a:off x="1465011" y="2091745"/>
+            <a:ext cx="1563939" cy="491884"/>
+          </a:xfrm>
+          <a:prstGeom prst="straightConnector1">
+            <a:avLst/>
+          </a:prstGeom>
+          <a:ln w="12700">
+            <a:solidFill>
+              <a:srgbClr val="002E50"/>
+            </a:solidFill>
+            <a:tailEnd type="triangle"/>
+          </a:ln>
+        </p:spPr>
+        <p:style>
+          <a:lnRef idx="1">
+            <a:schemeClr val="accent1"/>
+          </a:lnRef>
+          <a:fillRef idx="0">
+            <a:schemeClr val="accent1"/>
+          </a:fillRef>
+          <a:effectRef idx="0">
+            <a:schemeClr val="accent1"/>
+          </a:effectRef>
+          <a:fontRef idx="minor">
+            <a:schemeClr val="tx1"/>
+          </a:fontRef>
+        </p:style>
+      </p:cxnSp>
+      <p:cxnSp>
+        <p:nvCxnSpPr>
+          <p:cNvPr id="10" name="Gerade Verbindung mit Pfeil 9"/>
+          <p:cNvCxnSpPr/>
+          <p:nvPr/>
+        </p:nvCxnSpPr>
+        <p:spPr>
+          <a:xfrm>
+            <a:off x="4379530" y="3045033"/>
+            <a:ext cx="1563939" cy="491884"/>
+          </a:xfrm>
+          <a:prstGeom prst="straightConnector1">
+            <a:avLst/>
+          </a:prstGeom>
+          <a:ln w="12700">
+            <a:solidFill>
+              <a:srgbClr val="002E50"/>
+            </a:solidFill>
+            <a:tailEnd type="triangle"/>
+          </a:ln>
+        </p:spPr>
+        <p:style>
+          <a:lnRef idx="1">
+            <a:schemeClr val="accent1"/>
+          </a:lnRef>
+          <a:fillRef idx="0">
+            <a:schemeClr val="accent1"/>
+          </a:fillRef>
+          <a:effectRef idx="0">
+            <a:schemeClr val="accent1"/>
+          </a:effectRef>
+          <a:fontRef idx="minor">
+            <a:schemeClr val="tx1"/>
+          </a:fontRef>
+        </p:style>
+      </p:cxnSp>
       <p:pic>
         <p:nvPicPr>
-          <p:cNvPr id="8" name="Grafik 7"/>
+          <p:cNvPr id="11" name="Grafik 10"/>
+          <p:cNvPicPr>
+            <a:picLocks noChangeAspect="1"/>
+          </p:cNvPicPr>
+          <p:nvPr/>
+        </p:nvPicPr>
+        <p:blipFill rotWithShape="1">
+          <a:blip r:embed="rId2"/>
+          <a:srcRect r="43956"/>
+          <a:stretch/>
+        </p:blipFill>
+        <p:spPr>
+          <a:xfrm>
+            <a:off x="304768" y="3218750"/>
+            <a:ext cx="3931474" cy="1476135"/>
+          </a:xfrm>
+          <a:prstGeom prst="rect">
+            <a:avLst/>
+          </a:prstGeom>
+        </p:spPr>
+      </p:pic>
+      <p:pic>
+        <p:nvPicPr>
+          <p:cNvPr id="12" name="Grafik 11"/>
           <p:cNvPicPr>
             <a:picLocks noChangeAspect="1"/>
           </p:cNvPicPr>
           <p:nvPr/>
         </p:nvPicPr>
         <p:blipFill>
-          <a:blip r:embed="rId2"/>
+          <a:blip r:embed="rId3"/>
           <a:stretch>
             <a:fillRect/>
           </a:stretch>
         </p:blipFill>
         <p:spPr>
           <a:xfrm>
-            <a:off x="926620" y="1881160"/>
-            <a:ext cx="4671680" cy="1477313"/>
+            <a:off x="5704691" y="924496"/>
+            <a:ext cx="2134782" cy="2209058"/>
           </a:xfrm>
           <a:prstGeom prst="rect">
             <a:avLst/>
@@ -20537,7 +20827,7 @@
     </p:spTree>
     <p:extLst>
       <p:ext uri="{BB962C8B-B14F-4D97-AF65-F5344CB8AC3E}">
-        <p14:creationId xmlns:p14="http://schemas.microsoft.com/office/powerpoint/2010/main" val="3631216032"/>
+        <p14:creationId xmlns:p14="http://schemas.microsoft.com/office/powerpoint/2010/main" val="4000630951"/>
       </p:ext>
     </p:extLst>
   </p:cSld>
@@ -20554,7 +20844,7 @@
 </p:sld>
 </file>
 
-<file path=ppt/slides/slide11.xml><?xml version="1.0" encoding="utf-8"?>
+<file path=ppt/slides/slide4.xml><?xml version="1.0" encoding="utf-8"?>
 <p:sld xmlns:a="http://schemas.openxmlformats.org/drawingml/2006/main" xmlns:r="http://schemas.openxmlformats.org/officeDocument/2006/relationships" xmlns:p="http://schemas.openxmlformats.org/presentationml/2006/main">
   <p:cSld>
     <p:spTree>
@@ -20588,120 +20878,19 @@
           </a:bodyPr>
           <a:lstStyle/>
           <a:p>
-            <a:pPr>
-              <a:lnSpc>
-                <a:spcPct val="110000"/>
-              </a:lnSpc>
-            </a:pPr>
-            <a:r>
-              <a:rPr lang="en-US" dirty="0" smtClean="0">
-                <a:latin typeface="Roboto Light" panose="02000000000000000000" pitchFamily="2" charset="0"/>
-                <a:ea typeface="Roboto Light" panose="02000000000000000000" pitchFamily="2" charset="0"/>
-                <a:cs typeface="Roboto Light" panose="02000000000000000000" pitchFamily="2" charset="0"/>
-              </a:rPr>
-              <a:t>Command </a:t>
-            </a:r>
-            <a:r>
-              <a:rPr lang="en-US" dirty="0" smtClean="0">
-                <a:latin typeface="Roboto Light" panose="02000000000000000000" pitchFamily="2" charset="0"/>
-                <a:ea typeface="Roboto Light" panose="02000000000000000000" pitchFamily="2" charset="0"/>
-                <a:cs typeface="Roboto Light" panose="02000000000000000000" pitchFamily="2" charset="0"/>
-              </a:rPr>
-              <a:t>Line, </a:t>
-            </a:r>
-            <a:r>
-              <a:rPr lang="en-US" dirty="0" err="1" smtClean="0">
-                <a:latin typeface="Roboto Light" panose="02000000000000000000" pitchFamily="2" charset="0"/>
-                <a:ea typeface="Roboto Light" panose="02000000000000000000" pitchFamily="2" charset="0"/>
-                <a:cs typeface="Roboto Light" panose="02000000000000000000" pitchFamily="2" charset="0"/>
-              </a:rPr>
-              <a:t>Git</a:t>
-            </a:r>
-            <a:r>
-              <a:rPr lang="en-US" dirty="0" smtClean="0">
-                <a:latin typeface="Roboto Light" panose="02000000000000000000" pitchFamily="2" charset="0"/>
-                <a:ea typeface="Roboto Light" panose="02000000000000000000" pitchFamily="2" charset="0"/>
-                <a:cs typeface="Roboto Light" panose="02000000000000000000" pitchFamily="2" charset="0"/>
-              </a:rPr>
-              <a:t> Bash</a:t>
-            </a:r>
-            <a:endParaRPr lang="en-US" dirty="0" smtClean="0">
-              <a:latin typeface="Roboto Light" panose="02000000000000000000" pitchFamily="2" charset="0"/>
-              <a:ea typeface="Roboto Light" panose="02000000000000000000" pitchFamily="2" charset="0"/>
-              <a:cs typeface="Roboto Light" panose="02000000000000000000" pitchFamily="2" charset="0"/>
-            </a:endParaRPr>
-          </a:p>
-          <a:p>
-            <a:pPr>
-              <a:lnSpc>
-                <a:spcPct val="110000"/>
-              </a:lnSpc>
-            </a:pPr>
-            <a:r>
-              <a:rPr lang="en-US" dirty="0" smtClean="0">
-                <a:latin typeface="Roboto Light" panose="02000000000000000000" pitchFamily="2" charset="0"/>
-                <a:ea typeface="Roboto Light" panose="02000000000000000000" pitchFamily="2" charset="0"/>
-                <a:cs typeface="Roboto Light" panose="02000000000000000000" pitchFamily="2" charset="0"/>
-              </a:rPr>
-              <a:t>Virtual </a:t>
-            </a:r>
-            <a:r>
-              <a:rPr lang="en-US" dirty="0" err="1" smtClean="0">
-                <a:latin typeface="Roboto Light" panose="02000000000000000000" pitchFamily="2" charset="0"/>
-                <a:ea typeface="Roboto Light" panose="02000000000000000000" pitchFamily="2" charset="0"/>
-                <a:cs typeface="Roboto Light" panose="02000000000000000000" pitchFamily="2" charset="0"/>
-              </a:rPr>
-              <a:t>Enviroment</a:t>
-            </a:r>
-            <a:r>
-              <a:rPr lang="en-US" b="1" dirty="0" smtClean="0">
-                <a:latin typeface="Roboto" panose="02000000000000000000" pitchFamily="2" charset="0"/>
-                <a:ea typeface="Roboto" panose="02000000000000000000" pitchFamily="2" charset="0"/>
-                <a:cs typeface="Roboto" panose="02000000000000000000" pitchFamily="2" charset="0"/>
-              </a:rPr>
-              <a:t> </a:t>
-            </a:r>
-          </a:p>
-          <a:p>
             <a:pPr marL="0" indent="0">
               <a:lnSpc>
                 <a:spcPct val="110000"/>
               </a:lnSpc>
               <a:buNone/>
             </a:pPr>
-            <a:endParaRPr lang="en-US" b="1" dirty="0" smtClean="0">
-              <a:latin typeface="Roboto" panose="02000000000000000000" pitchFamily="2" charset="0"/>
-              <a:ea typeface="Roboto" panose="02000000000000000000" pitchFamily="2" charset="0"/>
-              <a:cs typeface="Roboto" panose="02000000000000000000" pitchFamily="2" charset="0"/>
-            </a:endParaRPr>
-          </a:p>
-          <a:p>
-            <a:pPr marL="0" indent="0">
-              <a:lnSpc>
-                <a:spcPct val="110000"/>
-              </a:lnSpc>
-              <a:buNone/>
-            </a:pPr>
-            <a:endParaRPr lang="en-US" dirty="0">
-              <a:latin typeface="+mn-lt"/>
-              <a:ea typeface="Roboto" panose="02000000000000000000" pitchFamily="2" charset="0"/>
-              <a:cs typeface="Roboto" panose="02000000000000000000" pitchFamily="2" charset="0"/>
-            </a:endParaRPr>
-          </a:p>
-          <a:p>
-            <a:pPr marL="0" indent="0">
-              <a:lnSpc>
-                <a:spcPct val="110000"/>
-              </a:lnSpc>
-              <a:buNone/>
-            </a:pPr>
             <a:r>
               <a:rPr lang="en-US" b="1" dirty="0" smtClean="0">
                 <a:latin typeface="Roboto" panose="02000000000000000000" pitchFamily="2" charset="0"/>
                 <a:ea typeface="Roboto" panose="02000000000000000000" pitchFamily="2" charset="0"/>
                 <a:cs typeface="Roboto" panose="02000000000000000000" pitchFamily="2" charset="0"/>
               </a:rPr>
-              <a:t>      </a:t>
+              <a:t>           </a:t>
             </a:r>
           </a:p>
         </p:txBody>
@@ -20770,7 +20959,924 @@
             <a:fld id="{C2A96E4E-EC3F-424D-8211-F17AF9FC0446}" type="slidenum">
               <a:rPr lang="de-DE" smtClean="0"/>
               <a:pPr/>
-              <a:t>10</a:t>
+              <a:t>3</a:t>
+            </a:fld>
+            <a:endParaRPr lang="de-DE" dirty="0"/>
+          </a:p>
+        </p:txBody>
+      </p:sp>
+      <p:sp>
+        <p:nvSpPr>
+          <p:cNvPr id="6" name="Titel 5"/>
+          <p:cNvSpPr>
+            <a:spLocks noGrp="1"/>
+          </p:cNvSpPr>
+          <p:nvPr>
+            <p:ph type="title"/>
+          </p:nvPr>
+        </p:nvSpPr>
+        <p:spPr/>
+        <p:txBody>
+          <a:bodyPr/>
+          <a:lstStyle/>
+          <a:p>
+            <a:r>
+              <a:rPr lang="de-DE" dirty="0" smtClean="0"/>
+              <a:t>Aufgaben</a:t>
+            </a:r>
+            <a:endParaRPr lang="de-DE" dirty="0"/>
+          </a:p>
+        </p:txBody>
+      </p:sp>
+      <p:graphicFrame>
+        <p:nvGraphicFramePr>
+          <p:cNvPr id="7" name="Diagramm 6"/>
+          <p:cNvGraphicFramePr/>
+          <p:nvPr>
+            <p:extLst>
+              <p:ext uri="{D42A27DB-BD31-4B8C-83A1-F6EECF244321}">
+                <p14:modId xmlns:p14="http://schemas.microsoft.com/office/powerpoint/2010/main" val="3611725255"/>
+              </p:ext>
+            </p:extLst>
+          </p:nvPr>
+        </p:nvGraphicFramePr>
+        <p:xfrm>
+          <a:off x="636398" y="699970"/>
+          <a:ext cx="4038074" cy="3008280"/>
+        </p:xfrm>
+        <a:graphic>
+          <a:graphicData uri="http://schemas.openxmlformats.org/drawingml/2006/diagram">
+            <dgm:relIds xmlns:dgm="http://schemas.openxmlformats.org/drawingml/2006/diagram" xmlns:r="http://schemas.openxmlformats.org/officeDocument/2006/relationships" r:dm="rId2" r:lo="rId3" r:qs="rId4" r:cs="rId5"/>
+          </a:graphicData>
+        </a:graphic>
+      </p:graphicFrame>
+      <p:graphicFrame>
+        <p:nvGraphicFramePr>
+          <p:cNvPr id="13" name="Diagramm 12"/>
+          <p:cNvGraphicFramePr/>
+          <p:nvPr>
+            <p:extLst>
+              <p:ext uri="{D42A27DB-BD31-4B8C-83A1-F6EECF244321}">
+                <p14:modId xmlns:p14="http://schemas.microsoft.com/office/powerpoint/2010/main" val="1481613124"/>
+              </p:ext>
+            </p:extLst>
+          </p:nvPr>
+        </p:nvGraphicFramePr>
+        <p:xfrm>
+          <a:off x="4032050" y="1086235"/>
+          <a:ext cx="4364436" cy="3506391"/>
+        </p:xfrm>
+        <a:graphic>
+          <a:graphicData uri="http://schemas.openxmlformats.org/drawingml/2006/diagram">
+            <dgm:relIds xmlns:dgm="http://schemas.openxmlformats.org/drawingml/2006/diagram" xmlns:r="http://schemas.openxmlformats.org/officeDocument/2006/relationships" r:dm="rId7" r:lo="rId8" r:qs="rId9" r:cs="rId10"/>
+          </a:graphicData>
+        </a:graphic>
+      </p:graphicFrame>
+    </p:spTree>
+    <p:extLst>
+      <p:ext uri="{BB962C8B-B14F-4D97-AF65-F5344CB8AC3E}">
+        <p14:creationId xmlns:p14="http://schemas.microsoft.com/office/powerpoint/2010/main" val="53456987"/>
+      </p:ext>
+    </p:extLst>
+  </p:cSld>
+  <p:clrMapOvr>
+    <a:masterClrMapping/>
+  </p:clrMapOvr>
+  <p:timing>
+    <p:tnLst>
+      <p:par>
+        <p:cTn id="1" dur="indefinite" restart="never" nodeType="tmRoot"/>
+      </p:par>
+    </p:tnLst>
+  </p:timing>
+</p:sld>
+</file>
+
+<file path=ppt/slides/slide5.xml><?xml version="1.0" encoding="utf-8"?>
+<p:sld xmlns:a="http://schemas.openxmlformats.org/drawingml/2006/main" xmlns:r="http://schemas.openxmlformats.org/officeDocument/2006/relationships" xmlns:p="http://schemas.openxmlformats.org/presentationml/2006/main">
+  <p:cSld>
+    <p:spTree>
+      <p:nvGrpSpPr>
+        <p:cNvPr id="1" name=""/>
+        <p:cNvGrpSpPr/>
+        <p:nvPr/>
+      </p:nvGrpSpPr>
+      <p:grpSpPr>
+        <a:xfrm>
+          <a:off x="0" y="0"/>
+          <a:ext cx="0" cy="0"/>
+          <a:chOff x="0" y="0"/>
+          <a:chExt cx="0" cy="0"/>
+        </a:xfrm>
+      </p:grpSpPr>
+      <p:sp>
+        <p:nvSpPr>
+          <p:cNvPr id="2" name="Vertikaler Textplatzhalter 1"/>
+          <p:cNvSpPr>
+            <a:spLocks noGrp="1"/>
+          </p:cNvSpPr>
+          <p:nvPr>
+            <p:ph type="body" orient="vert" idx="1"/>
+          </p:nvPr>
+        </p:nvSpPr>
+        <p:spPr/>
+        <p:txBody>
+          <a:bodyPr>
+            <a:normAutofit/>
+          </a:bodyPr>
+          <a:lstStyle/>
+          <a:p>
+            <a:pPr marL="0" indent="0">
+              <a:lnSpc>
+                <a:spcPct val="110000"/>
+              </a:lnSpc>
+              <a:buNone/>
+            </a:pPr>
+            <a:r>
+              <a:rPr lang="en-US" b="1" dirty="0" smtClean="0">
+                <a:latin typeface="Roboto" panose="02000000000000000000" pitchFamily="2" charset="0"/>
+                <a:ea typeface="Roboto" panose="02000000000000000000" pitchFamily="2" charset="0"/>
+                <a:cs typeface="Roboto" panose="02000000000000000000" pitchFamily="2" charset="0"/>
+              </a:rPr>
+              <a:t>           </a:t>
+            </a:r>
+          </a:p>
+          <a:p>
+            <a:pPr marL="0" indent="0">
+              <a:lnSpc>
+                <a:spcPct val="110000"/>
+              </a:lnSpc>
+              <a:buNone/>
+            </a:pPr>
+            <a:r>
+              <a:rPr lang="en-US" dirty="0" smtClean="0">
+                <a:latin typeface="+mn-lt"/>
+                <a:ea typeface="Roboto" panose="02000000000000000000" pitchFamily="2" charset="0"/>
+                <a:cs typeface="Roboto" panose="02000000000000000000" pitchFamily="2" charset="0"/>
+              </a:rPr>
+              <a:t>	asana		</a:t>
+            </a:r>
+            <a:r>
+              <a:rPr lang="en-US" dirty="0" smtClean="0">
+                <a:latin typeface="+mn-lt"/>
+                <a:ea typeface="Roboto" panose="02000000000000000000" pitchFamily="2" charset="0"/>
+                <a:cs typeface="Roboto" panose="02000000000000000000" pitchFamily="2" charset="0"/>
+                <a:sym typeface="Wingdings" panose="05000000000000000000" pitchFamily="2" charset="2"/>
+              </a:rPr>
+              <a:t> </a:t>
+            </a:r>
+            <a:r>
+              <a:rPr lang="en-US" dirty="0" err="1" smtClean="0">
+                <a:latin typeface="+mn-lt"/>
+                <a:ea typeface="Roboto" panose="02000000000000000000" pitchFamily="2" charset="0"/>
+                <a:cs typeface="Roboto" panose="02000000000000000000" pitchFamily="2" charset="0"/>
+                <a:sym typeface="Wingdings" panose="05000000000000000000" pitchFamily="2" charset="2"/>
+              </a:rPr>
+              <a:t>Organisation</a:t>
+            </a:r>
+            <a:r>
+              <a:rPr lang="en-US" dirty="0" smtClean="0">
+                <a:latin typeface="+mn-lt"/>
+                <a:ea typeface="Roboto" panose="02000000000000000000" pitchFamily="2" charset="0"/>
+                <a:cs typeface="Roboto" panose="02000000000000000000" pitchFamily="2" charset="0"/>
+                <a:sym typeface="Wingdings" panose="05000000000000000000" pitchFamily="2" charset="2"/>
+              </a:rPr>
+              <a:t> der </a:t>
+            </a:r>
+            <a:r>
+              <a:rPr lang="en-US" dirty="0" err="1" smtClean="0">
+                <a:latin typeface="+mn-lt"/>
+                <a:ea typeface="Roboto" panose="02000000000000000000" pitchFamily="2" charset="0"/>
+                <a:cs typeface="Roboto" panose="02000000000000000000" pitchFamily="2" charset="0"/>
+                <a:sym typeface="Wingdings" panose="05000000000000000000" pitchFamily="2" charset="2"/>
+              </a:rPr>
+              <a:t>Aufgaben</a:t>
+            </a:r>
+            <a:endParaRPr lang="en-US" dirty="0" smtClean="0">
+              <a:latin typeface="+mn-lt"/>
+              <a:ea typeface="Roboto" panose="02000000000000000000" pitchFamily="2" charset="0"/>
+              <a:cs typeface="Roboto" panose="02000000000000000000" pitchFamily="2" charset="0"/>
+              <a:sym typeface="Wingdings" panose="05000000000000000000" pitchFamily="2" charset="2"/>
+            </a:endParaRPr>
+          </a:p>
+          <a:p>
+            <a:pPr marL="0" indent="0">
+              <a:lnSpc>
+                <a:spcPct val="110000"/>
+              </a:lnSpc>
+              <a:buNone/>
+            </a:pPr>
+            <a:r>
+              <a:rPr lang="en-US" dirty="0">
+                <a:latin typeface="+mn-lt"/>
+                <a:ea typeface="Roboto" panose="02000000000000000000" pitchFamily="2" charset="0"/>
+                <a:cs typeface="Roboto" panose="02000000000000000000" pitchFamily="2" charset="0"/>
+                <a:sym typeface="Wingdings" panose="05000000000000000000" pitchFamily="2" charset="2"/>
+              </a:rPr>
+              <a:t>	</a:t>
+            </a:r>
+            <a:r>
+              <a:rPr lang="en-US" dirty="0" err="1" smtClean="0">
+                <a:latin typeface="+mn-lt"/>
+                <a:ea typeface="Roboto" panose="02000000000000000000" pitchFamily="2" charset="0"/>
+                <a:cs typeface="Roboto" panose="02000000000000000000" pitchFamily="2" charset="0"/>
+                <a:sym typeface="Wingdings" panose="05000000000000000000" pitchFamily="2" charset="2"/>
+              </a:rPr>
+              <a:t>DeepL</a:t>
+            </a:r>
+            <a:r>
+              <a:rPr lang="en-US" dirty="0" smtClean="0">
+                <a:latin typeface="+mn-lt"/>
+                <a:ea typeface="Roboto" panose="02000000000000000000" pitchFamily="2" charset="0"/>
+                <a:cs typeface="Roboto" panose="02000000000000000000" pitchFamily="2" charset="0"/>
+                <a:sym typeface="Wingdings" panose="05000000000000000000" pitchFamily="2" charset="2"/>
+              </a:rPr>
+              <a:t>		 </a:t>
+            </a:r>
+            <a:r>
+              <a:rPr lang="en-US" dirty="0" err="1" smtClean="0">
+                <a:latin typeface="+mn-lt"/>
+                <a:ea typeface="Roboto" panose="02000000000000000000" pitchFamily="2" charset="0"/>
+                <a:cs typeface="Roboto" panose="02000000000000000000" pitchFamily="2" charset="0"/>
+                <a:sym typeface="Wingdings" panose="05000000000000000000" pitchFamily="2" charset="2"/>
+              </a:rPr>
+              <a:t>Übersetzer</a:t>
+            </a:r>
+            <a:endParaRPr lang="en-US" dirty="0" smtClean="0">
+              <a:latin typeface="+mn-lt"/>
+              <a:ea typeface="Roboto" panose="02000000000000000000" pitchFamily="2" charset="0"/>
+              <a:cs typeface="Roboto" panose="02000000000000000000" pitchFamily="2" charset="0"/>
+              <a:sym typeface="Wingdings" panose="05000000000000000000" pitchFamily="2" charset="2"/>
+            </a:endParaRPr>
+          </a:p>
+          <a:p>
+            <a:pPr marL="0" indent="0">
+              <a:lnSpc>
+                <a:spcPct val="110000"/>
+              </a:lnSpc>
+              <a:buNone/>
+            </a:pPr>
+            <a:r>
+              <a:rPr lang="en-US" dirty="0">
+                <a:latin typeface="+mn-lt"/>
+                <a:ea typeface="Roboto" panose="02000000000000000000" pitchFamily="2" charset="0"/>
+                <a:cs typeface="Roboto" panose="02000000000000000000" pitchFamily="2" charset="0"/>
+                <a:sym typeface="Wingdings" panose="05000000000000000000" pitchFamily="2" charset="2"/>
+              </a:rPr>
+              <a:t>	</a:t>
+            </a:r>
+            <a:r>
+              <a:rPr lang="en-US" dirty="0" err="1" smtClean="0">
+                <a:latin typeface="+mn-lt"/>
+                <a:ea typeface="Roboto" panose="02000000000000000000" pitchFamily="2" charset="0"/>
+                <a:cs typeface="Roboto" panose="02000000000000000000" pitchFamily="2" charset="0"/>
+                <a:sym typeface="Wingdings" panose="05000000000000000000" pitchFamily="2" charset="2"/>
+              </a:rPr>
+              <a:t>Mentimeter</a:t>
+            </a:r>
+            <a:r>
+              <a:rPr lang="en-US" dirty="0" smtClean="0">
+                <a:latin typeface="+mn-lt"/>
+                <a:ea typeface="Roboto" panose="02000000000000000000" pitchFamily="2" charset="0"/>
+                <a:cs typeface="Roboto" panose="02000000000000000000" pitchFamily="2" charset="0"/>
+                <a:sym typeface="Wingdings" panose="05000000000000000000" pitchFamily="2" charset="2"/>
+              </a:rPr>
+              <a:t>	 </a:t>
+            </a:r>
+            <a:r>
+              <a:rPr lang="en-US" dirty="0" err="1" smtClean="0">
+                <a:latin typeface="+mn-lt"/>
+                <a:ea typeface="Roboto" panose="02000000000000000000" pitchFamily="2" charset="0"/>
+                <a:cs typeface="Roboto" panose="02000000000000000000" pitchFamily="2" charset="0"/>
+                <a:sym typeface="Wingdings" panose="05000000000000000000" pitchFamily="2" charset="2"/>
+              </a:rPr>
+              <a:t>Umfragen</a:t>
+            </a:r>
+            <a:r>
+              <a:rPr lang="en-US" dirty="0" smtClean="0">
+                <a:latin typeface="+mn-lt"/>
+                <a:ea typeface="Roboto" panose="02000000000000000000" pitchFamily="2" charset="0"/>
+                <a:cs typeface="Roboto" panose="02000000000000000000" pitchFamily="2" charset="0"/>
+                <a:sym typeface="Wingdings" panose="05000000000000000000" pitchFamily="2" charset="2"/>
+              </a:rPr>
+              <a:t>/ </a:t>
+            </a:r>
+            <a:r>
+              <a:rPr lang="en-US" dirty="0" err="1" smtClean="0">
+                <a:latin typeface="+mn-lt"/>
+                <a:ea typeface="Roboto" panose="02000000000000000000" pitchFamily="2" charset="0"/>
+                <a:cs typeface="Roboto" panose="02000000000000000000" pitchFamily="2" charset="0"/>
+                <a:sym typeface="Wingdings" panose="05000000000000000000" pitchFamily="2" charset="2"/>
+              </a:rPr>
+              <a:t>Meinungsbild</a:t>
+            </a:r>
+            <a:endParaRPr lang="en-US" dirty="0" smtClean="0">
+              <a:latin typeface="+mn-lt"/>
+              <a:ea typeface="Roboto" panose="02000000000000000000" pitchFamily="2" charset="0"/>
+              <a:cs typeface="Roboto" panose="02000000000000000000" pitchFamily="2" charset="0"/>
+              <a:sym typeface="Wingdings" panose="05000000000000000000" pitchFamily="2" charset="2"/>
+            </a:endParaRPr>
+          </a:p>
+          <a:p>
+            <a:pPr marL="0" indent="0">
+              <a:lnSpc>
+                <a:spcPct val="110000"/>
+              </a:lnSpc>
+              <a:buNone/>
+            </a:pPr>
+            <a:r>
+              <a:rPr lang="en-US" dirty="0">
+                <a:latin typeface="+mn-lt"/>
+                <a:ea typeface="Roboto" panose="02000000000000000000" pitchFamily="2" charset="0"/>
+                <a:cs typeface="Roboto" panose="02000000000000000000" pitchFamily="2" charset="0"/>
+                <a:sym typeface="Wingdings" panose="05000000000000000000" pitchFamily="2" charset="2"/>
+              </a:rPr>
+              <a:t>	</a:t>
+            </a:r>
+            <a:r>
+              <a:rPr lang="en-US" dirty="0" smtClean="0">
+                <a:latin typeface="+mn-lt"/>
+                <a:ea typeface="Roboto" panose="02000000000000000000" pitchFamily="2" charset="0"/>
+                <a:cs typeface="Roboto" panose="02000000000000000000" pitchFamily="2" charset="0"/>
+                <a:sym typeface="Wingdings" panose="05000000000000000000" pitchFamily="2" charset="2"/>
+              </a:rPr>
+              <a:t>Miro Board	 Mind Map</a:t>
+            </a:r>
+            <a:endParaRPr lang="en-US" dirty="0" smtClean="0">
+              <a:latin typeface="+mn-lt"/>
+              <a:ea typeface="Roboto" panose="02000000000000000000" pitchFamily="2" charset="0"/>
+              <a:cs typeface="Roboto" panose="02000000000000000000" pitchFamily="2" charset="0"/>
+            </a:endParaRPr>
+          </a:p>
+        </p:txBody>
+      </p:sp>
+      <p:sp>
+        <p:nvSpPr>
+          <p:cNvPr id="3" name="Datumsplatzhalter 2"/>
+          <p:cNvSpPr>
+            <a:spLocks noGrp="1"/>
+          </p:cNvSpPr>
+          <p:nvPr>
+            <p:ph type="dt" sz="half" idx="10"/>
+          </p:nvPr>
+        </p:nvSpPr>
+        <p:spPr/>
+        <p:txBody>
+          <a:bodyPr/>
+          <a:lstStyle/>
+          <a:p>
+            <a:fld id="{22DC5AD6-A57E-4A83-84DC-685C8F7A0281}" type="datetime4">
+              <a:rPr lang="en-US" smtClean="0"/>
+              <a:t>August 6, 2021</a:t>
+            </a:fld>
+            <a:endParaRPr lang="de-DE" dirty="0"/>
+          </a:p>
+        </p:txBody>
+      </p:sp>
+      <p:sp>
+        <p:nvSpPr>
+          <p:cNvPr id="4" name="Fußzeilenplatzhalter 3"/>
+          <p:cNvSpPr>
+            <a:spLocks noGrp="1"/>
+          </p:cNvSpPr>
+          <p:nvPr>
+            <p:ph type="ftr" sz="quarter" idx="11"/>
+          </p:nvPr>
+        </p:nvSpPr>
+        <p:spPr/>
+        <p:txBody>
+          <a:bodyPr/>
+          <a:lstStyle/>
+          <a:p>
+            <a:r>
+              <a:rPr lang="de-DE" smtClean="0"/>
+              <a:t>Reiner Lemoine Institut</a:t>
+            </a:r>
+            <a:endParaRPr lang="de-DE" dirty="0"/>
+          </a:p>
+        </p:txBody>
+      </p:sp>
+      <p:sp>
+        <p:nvSpPr>
+          <p:cNvPr id="5" name="Foliennummernplatzhalter 4"/>
+          <p:cNvSpPr>
+            <a:spLocks noGrp="1"/>
+          </p:cNvSpPr>
+          <p:nvPr>
+            <p:ph type="sldNum" sz="quarter" idx="12"/>
+          </p:nvPr>
+        </p:nvSpPr>
+        <p:spPr/>
+        <p:txBody>
+          <a:bodyPr/>
+          <a:lstStyle/>
+          <a:p>
+            <a:fld id="{C2A96E4E-EC3F-424D-8211-F17AF9FC0446}" type="slidenum">
+              <a:rPr lang="de-DE" smtClean="0"/>
+              <a:pPr/>
+              <a:t>4</a:t>
+            </a:fld>
+            <a:endParaRPr lang="de-DE" dirty="0"/>
+          </a:p>
+        </p:txBody>
+      </p:sp>
+      <p:sp>
+        <p:nvSpPr>
+          <p:cNvPr id="6" name="Titel 5"/>
+          <p:cNvSpPr>
+            <a:spLocks noGrp="1"/>
+          </p:cNvSpPr>
+          <p:nvPr>
+            <p:ph type="title"/>
+          </p:nvPr>
+        </p:nvSpPr>
+        <p:spPr/>
+        <p:txBody>
+          <a:bodyPr/>
+          <a:lstStyle/>
+          <a:p>
+            <a:r>
+              <a:rPr lang="de-DE" dirty="0" smtClean="0"/>
+              <a:t>Tools</a:t>
+            </a:r>
+            <a:endParaRPr lang="de-DE" dirty="0"/>
+          </a:p>
+        </p:txBody>
+      </p:sp>
+      <p:pic>
+        <p:nvPicPr>
+          <p:cNvPr id="9" name="Grafik 8"/>
+          <p:cNvPicPr>
+            <a:picLocks noChangeAspect="1"/>
+          </p:cNvPicPr>
+          <p:nvPr/>
+        </p:nvPicPr>
+        <p:blipFill>
+          <a:blip r:embed="rId2">
+            <a:extLst>
+              <a:ext uri="{28A0092B-C50C-407E-A947-70E740481C1C}">
+                <a14:useLocalDpi xmlns:a14="http://schemas.microsoft.com/office/drawing/2010/main" val="0"/>
+              </a:ext>
+            </a:extLst>
+          </a:blip>
+          <a:stretch>
+            <a:fillRect/>
+          </a:stretch>
+        </p:blipFill>
+        <p:spPr>
+          <a:xfrm>
+            <a:off x="836188" y="1515814"/>
+            <a:ext cx="365093" cy="365093"/>
+          </a:xfrm>
+          <a:prstGeom prst="rect">
+            <a:avLst/>
+          </a:prstGeom>
+        </p:spPr>
+      </p:pic>
+      <p:pic>
+        <p:nvPicPr>
+          <p:cNvPr id="11" name="Grafik 10"/>
+          <p:cNvPicPr>
+            <a:picLocks noChangeAspect="1"/>
+          </p:cNvPicPr>
+          <p:nvPr/>
+        </p:nvPicPr>
+        <p:blipFill>
+          <a:blip r:embed="rId3">
+            <a:extLst>
+              <a:ext uri="{28A0092B-C50C-407E-A947-70E740481C1C}">
+                <a14:useLocalDpi xmlns:a14="http://schemas.microsoft.com/office/drawing/2010/main" val="0"/>
+              </a:ext>
+            </a:extLst>
+          </a:blip>
+          <a:stretch>
+            <a:fillRect/>
+          </a:stretch>
+        </p:blipFill>
+        <p:spPr>
+          <a:xfrm>
+            <a:off x="816975" y="1988373"/>
+            <a:ext cx="403521" cy="403521"/>
+          </a:xfrm>
+          <a:prstGeom prst="rect">
+            <a:avLst/>
+          </a:prstGeom>
+        </p:spPr>
+      </p:pic>
+      <p:pic>
+        <p:nvPicPr>
+          <p:cNvPr id="7" name="Grafik 6"/>
+          <p:cNvPicPr>
+            <a:picLocks noChangeAspect="1"/>
+          </p:cNvPicPr>
+          <p:nvPr/>
+        </p:nvPicPr>
+        <p:blipFill rotWithShape="1">
+          <a:blip r:embed="rId4">
+            <a:extLst>
+              <a:ext uri="{28A0092B-C50C-407E-A947-70E740481C1C}">
+                <a14:useLocalDpi xmlns:a14="http://schemas.microsoft.com/office/drawing/2010/main" val="0"/>
+              </a:ext>
+            </a:extLst>
+          </a:blip>
+          <a:srcRect l="35583" r="33417" b="30048"/>
+          <a:stretch/>
+        </p:blipFill>
+        <p:spPr>
+          <a:xfrm>
+            <a:off x="823627" y="2499360"/>
+            <a:ext cx="447648" cy="373380"/>
+          </a:xfrm>
+          <a:prstGeom prst="rect">
+            <a:avLst/>
+          </a:prstGeom>
+        </p:spPr>
+      </p:pic>
+      <p:pic>
+        <p:nvPicPr>
+          <p:cNvPr id="8" name="Grafik 7"/>
+          <p:cNvPicPr>
+            <a:picLocks noChangeAspect="1"/>
+          </p:cNvPicPr>
+          <p:nvPr/>
+        </p:nvPicPr>
+        <p:blipFill>
+          <a:blip r:embed="rId5">
+            <a:extLst>
+              <a:ext uri="{28A0092B-C50C-407E-A947-70E740481C1C}">
+                <a14:useLocalDpi xmlns:a14="http://schemas.microsoft.com/office/drawing/2010/main" val="0"/>
+              </a:ext>
+            </a:extLst>
+          </a:blip>
+          <a:stretch>
+            <a:fillRect/>
+          </a:stretch>
+        </p:blipFill>
+        <p:spPr>
+          <a:xfrm>
+            <a:off x="861634" y="2980206"/>
+            <a:ext cx="339647" cy="339647"/>
+          </a:xfrm>
+          <a:prstGeom prst="rect">
+            <a:avLst/>
+          </a:prstGeom>
+        </p:spPr>
+      </p:pic>
+    </p:spTree>
+    <p:extLst>
+      <p:ext uri="{BB962C8B-B14F-4D97-AF65-F5344CB8AC3E}">
+        <p14:creationId xmlns:p14="http://schemas.microsoft.com/office/powerpoint/2010/main" val="1041178221"/>
+      </p:ext>
+    </p:extLst>
+  </p:cSld>
+  <p:clrMapOvr>
+    <a:masterClrMapping/>
+  </p:clrMapOvr>
+  <p:timing>
+    <p:tnLst>
+      <p:par>
+        <p:cTn id="1" dur="indefinite" restart="never" nodeType="tmRoot"/>
+      </p:par>
+    </p:tnLst>
+  </p:timing>
+</p:sld>
+</file>
+
+<file path=ppt/slides/slide6.xml><?xml version="1.0" encoding="utf-8"?>
+<p:sld xmlns:a="http://schemas.openxmlformats.org/drawingml/2006/main" xmlns:r="http://schemas.openxmlformats.org/officeDocument/2006/relationships" xmlns:p="http://schemas.openxmlformats.org/presentationml/2006/main">
+  <p:cSld>
+    <p:spTree>
+      <p:nvGrpSpPr>
+        <p:cNvPr id="1" name=""/>
+        <p:cNvGrpSpPr/>
+        <p:nvPr/>
+      </p:nvGrpSpPr>
+      <p:grpSpPr>
+        <a:xfrm>
+          <a:off x="0" y="0"/>
+          <a:ext cx="0" cy="0"/>
+          <a:chOff x="0" y="0"/>
+          <a:chExt cx="0" cy="0"/>
+        </a:xfrm>
+      </p:grpSpPr>
+      <p:sp>
+        <p:nvSpPr>
+          <p:cNvPr id="3" name="Datumsplatzhalter 2"/>
+          <p:cNvSpPr>
+            <a:spLocks noGrp="1"/>
+          </p:cNvSpPr>
+          <p:nvPr>
+            <p:ph type="dt" sz="half" idx="10"/>
+          </p:nvPr>
+        </p:nvSpPr>
+        <p:spPr/>
+        <p:txBody>
+          <a:bodyPr/>
+          <a:lstStyle/>
+          <a:p>
+            <a:fld id="{361AB9F4-E407-4647-87A8-CA083E5FB64E}" type="datetime4">
+              <a:rPr lang="en-US" smtClean="0"/>
+              <a:t>August 6, 2021</a:t>
+            </a:fld>
+            <a:endParaRPr lang="de-DE" dirty="0"/>
+          </a:p>
+        </p:txBody>
+      </p:sp>
+      <p:sp>
+        <p:nvSpPr>
+          <p:cNvPr id="4" name="Fußzeilenplatzhalter 3"/>
+          <p:cNvSpPr>
+            <a:spLocks noGrp="1"/>
+          </p:cNvSpPr>
+          <p:nvPr>
+            <p:ph type="ftr" sz="quarter" idx="11"/>
+          </p:nvPr>
+        </p:nvSpPr>
+        <p:spPr/>
+        <p:txBody>
+          <a:bodyPr/>
+          <a:lstStyle/>
+          <a:p>
+            <a:r>
+              <a:rPr lang="de-DE" smtClean="0"/>
+              <a:t>Reiner Lemoine Institut</a:t>
+            </a:r>
+            <a:endParaRPr lang="de-DE" dirty="0"/>
+          </a:p>
+        </p:txBody>
+      </p:sp>
+      <p:sp>
+        <p:nvSpPr>
+          <p:cNvPr id="5" name="Foliennummernplatzhalter 4"/>
+          <p:cNvSpPr>
+            <a:spLocks noGrp="1"/>
+          </p:cNvSpPr>
+          <p:nvPr>
+            <p:ph type="sldNum" sz="quarter" idx="12"/>
+          </p:nvPr>
+        </p:nvSpPr>
+        <p:spPr/>
+        <p:txBody>
+          <a:bodyPr/>
+          <a:lstStyle/>
+          <a:p>
+            <a:fld id="{C2A96E4E-EC3F-424D-8211-F17AF9FC0446}" type="slidenum">
+              <a:rPr lang="de-DE" smtClean="0"/>
+              <a:pPr/>
+              <a:t>5</a:t>
+            </a:fld>
+            <a:endParaRPr lang="de-DE" dirty="0"/>
+          </a:p>
+        </p:txBody>
+      </p:sp>
+      <p:pic>
+        <p:nvPicPr>
+          <p:cNvPr id="2" name="Grafik 1"/>
+          <p:cNvPicPr>
+            <a:picLocks noChangeAspect="1"/>
+          </p:cNvPicPr>
+          <p:nvPr/>
+        </p:nvPicPr>
+        <p:blipFill>
+          <a:blip r:embed="rId2"/>
+          <a:stretch>
+            <a:fillRect/>
+          </a:stretch>
+        </p:blipFill>
+        <p:spPr>
+          <a:xfrm>
+            <a:off x="334297" y="0"/>
+            <a:ext cx="8675515" cy="4868911"/>
+          </a:xfrm>
+          <a:prstGeom prst="rect">
+            <a:avLst/>
+          </a:prstGeom>
+        </p:spPr>
+      </p:pic>
+    </p:spTree>
+    <p:extLst>
+      <p:ext uri="{BB962C8B-B14F-4D97-AF65-F5344CB8AC3E}">
+        <p14:creationId xmlns:p14="http://schemas.microsoft.com/office/powerpoint/2010/main" val="476963574"/>
+      </p:ext>
+    </p:extLst>
+  </p:cSld>
+  <p:clrMapOvr>
+    <a:masterClrMapping/>
+  </p:clrMapOvr>
+  <p:timing>
+    <p:tnLst>
+      <p:par>
+        <p:cTn id="1" dur="indefinite" restart="never" nodeType="tmRoot"/>
+      </p:par>
+    </p:tnLst>
+  </p:timing>
+</p:sld>
+</file>
+
+<file path=ppt/slides/slide7.xml><?xml version="1.0" encoding="utf-8"?>
+<p:sld xmlns:a="http://schemas.openxmlformats.org/drawingml/2006/main" xmlns:r="http://schemas.openxmlformats.org/officeDocument/2006/relationships" xmlns:p="http://schemas.openxmlformats.org/presentationml/2006/main">
+  <p:cSld>
+    <p:spTree>
+      <p:nvGrpSpPr>
+        <p:cNvPr id="1" name=""/>
+        <p:cNvGrpSpPr/>
+        <p:nvPr/>
+      </p:nvGrpSpPr>
+      <p:grpSpPr>
+        <a:xfrm>
+          <a:off x="0" y="0"/>
+          <a:ext cx="0" cy="0"/>
+          <a:chOff x="0" y="0"/>
+          <a:chExt cx="0" cy="0"/>
+        </a:xfrm>
+      </p:grpSpPr>
+      <p:sp>
+        <p:nvSpPr>
+          <p:cNvPr id="2" name="Vertikaler Textplatzhalter 1"/>
+          <p:cNvSpPr>
+            <a:spLocks noGrp="1"/>
+          </p:cNvSpPr>
+          <p:nvPr>
+            <p:ph type="body" orient="vert" idx="1"/>
+          </p:nvPr>
+        </p:nvSpPr>
+        <p:spPr/>
+        <p:txBody>
+          <a:bodyPr>
+            <a:normAutofit/>
+          </a:bodyPr>
+          <a:lstStyle/>
+          <a:p>
+            <a:pPr>
+              <a:lnSpc>
+                <a:spcPct val="110000"/>
+              </a:lnSpc>
+            </a:pPr>
+            <a:r>
+              <a:rPr lang="en-US" dirty="0" smtClean="0">
+                <a:latin typeface="Roboto Light" panose="02000000000000000000" pitchFamily="2" charset="0"/>
+                <a:ea typeface="Roboto Light" panose="02000000000000000000" pitchFamily="2" charset="0"/>
+                <a:cs typeface="Roboto Light" panose="02000000000000000000" pitchFamily="2" charset="0"/>
+              </a:rPr>
+              <a:t>Command Line, </a:t>
+            </a:r>
+            <a:r>
+              <a:rPr lang="en-US" dirty="0" err="1" smtClean="0">
+                <a:latin typeface="Roboto Light" panose="02000000000000000000" pitchFamily="2" charset="0"/>
+                <a:ea typeface="Roboto Light" panose="02000000000000000000" pitchFamily="2" charset="0"/>
+                <a:cs typeface="Roboto Light" panose="02000000000000000000" pitchFamily="2" charset="0"/>
+              </a:rPr>
+              <a:t>Git</a:t>
+            </a:r>
+            <a:r>
+              <a:rPr lang="en-US" dirty="0" smtClean="0">
+                <a:latin typeface="Roboto Light" panose="02000000000000000000" pitchFamily="2" charset="0"/>
+                <a:ea typeface="Roboto Light" panose="02000000000000000000" pitchFamily="2" charset="0"/>
+                <a:cs typeface="Roboto Light" panose="02000000000000000000" pitchFamily="2" charset="0"/>
+              </a:rPr>
+              <a:t> Bash</a:t>
+            </a:r>
+          </a:p>
+          <a:p>
+            <a:pPr>
+              <a:lnSpc>
+                <a:spcPct val="110000"/>
+              </a:lnSpc>
+            </a:pPr>
+            <a:r>
+              <a:rPr lang="en-US" dirty="0" smtClean="0">
+                <a:latin typeface="Roboto Light" panose="02000000000000000000" pitchFamily="2" charset="0"/>
+                <a:ea typeface="Roboto Light" panose="02000000000000000000" pitchFamily="2" charset="0"/>
+                <a:cs typeface="Roboto Light" panose="02000000000000000000" pitchFamily="2" charset="0"/>
+              </a:rPr>
+              <a:t>Virtual </a:t>
+            </a:r>
+            <a:r>
+              <a:rPr lang="en-US" dirty="0" err="1" smtClean="0">
+                <a:latin typeface="Roboto Light" panose="02000000000000000000" pitchFamily="2" charset="0"/>
+                <a:ea typeface="Roboto Light" panose="02000000000000000000" pitchFamily="2" charset="0"/>
+                <a:cs typeface="Roboto Light" panose="02000000000000000000" pitchFamily="2" charset="0"/>
+              </a:rPr>
+              <a:t>Enviroment</a:t>
+            </a:r>
+            <a:r>
+              <a:rPr lang="en-US" b="1" dirty="0" smtClean="0">
+                <a:latin typeface="Roboto" panose="02000000000000000000" pitchFamily="2" charset="0"/>
+                <a:ea typeface="Roboto" panose="02000000000000000000" pitchFamily="2" charset="0"/>
+                <a:cs typeface="Roboto" panose="02000000000000000000" pitchFamily="2" charset="0"/>
+              </a:rPr>
+              <a:t> </a:t>
+            </a:r>
+          </a:p>
+          <a:p>
+            <a:pPr marL="0" indent="0">
+              <a:lnSpc>
+                <a:spcPct val="110000"/>
+              </a:lnSpc>
+              <a:buNone/>
+            </a:pPr>
+            <a:endParaRPr lang="en-US" b="1" dirty="0" smtClean="0">
+              <a:latin typeface="Roboto" panose="02000000000000000000" pitchFamily="2" charset="0"/>
+              <a:ea typeface="Roboto" panose="02000000000000000000" pitchFamily="2" charset="0"/>
+              <a:cs typeface="Roboto" panose="02000000000000000000" pitchFamily="2" charset="0"/>
+            </a:endParaRPr>
+          </a:p>
+          <a:p>
+            <a:pPr marL="0" indent="0">
+              <a:lnSpc>
+                <a:spcPct val="110000"/>
+              </a:lnSpc>
+              <a:buNone/>
+            </a:pPr>
+            <a:endParaRPr lang="en-US" dirty="0">
+              <a:latin typeface="+mn-lt"/>
+              <a:ea typeface="Roboto" panose="02000000000000000000" pitchFamily="2" charset="0"/>
+              <a:cs typeface="Roboto" panose="02000000000000000000" pitchFamily="2" charset="0"/>
+            </a:endParaRPr>
+          </a:p>
+          <a:p>
+            <a:pPr marL="0" indent="0">
+              <a:lnSpc>
+                <a:spcPct val="110000"/>
+              </a:lnSpc>
+              <a:buNone/>
+            </a:pPr>
+            <a:r>
+              <a:rPr lang="en-US" b="1" dirty="0" smtClean="0">
+                <a:latin typeface="Roboto" panose="02000000000000000000" pitchFamily="2" charset="0"/>
+                <a:ea typeface="Roboto" panose="02000000000000000000" pitchFamily="2" charset="0"/>
+                <a:cs typeface="Roboto" panose="02000000000000000000" pitchFamily="2" charset="0"/>
+              </a:rPr>
+              <a:t>      </a:t>
+            </a:r>
+          </a:p>
+        </p:txBody>
+      </p:sp>
+      <p:sp>
+        <p:nvSpPr>
+          <p:cNvPr id="3" name="Datumsplatzhalter 2"/>
+          <p:cNvSpPr>
+            <a:spLocks noGrp="1"/>
+          </p:cNvSpPr>
+          <p:nvPr>
+            <p:ph type="dt" sz="half" idx="10"/>
+          </p:nvPr>
+        </p:nvSpPr>
+        <p:spPr/>
+        <p:txBody>
+          <a:bodyPr/>
+          <a:lstStyle/>
+          <a:p>
+            <a:fld id="{22DC5AD6-A57E-4A83-84DC-685C8F7A0281}" type="datetime4">
+              <a:rPr lang="en-US" smtClean="0"/>
+              <a:t>August 6, 2021</a:t>
+            </a:fld>
+            <a:endParaRPr lang="de-DE" dirty="0"/>
+          </a:p>
+        </p:txBody>
+      </p:sp>
+      <p:sp>
+        <p:nvSpPr>
+          <p:cNvPr id="4" name="Fußzeilenplatzhalter 3"/>
+          <p:cNvSpPr>
+            <a:spLocks noGrp="1"/>
+          </p:cNvSpPr>
+          <p:nvPr>
+            <p:ph type="ftr" sz="quarter" idx="11"/>
+          </p:nvPr>
+        </p:nvSpPr>
+        <p:spPr/>
+        <p:txBody>
+          <a:bodyPr/>
+          <a:lstStyle/>
+          <a:p>
+            <a:r>
+              <a:rPr lang="de-DE" smtClean="0"/>
+              <a:t>Reiner Lemoine Institut</a:t>
+            </a:r>
+            <a:endParaRPr lang="de-DE" dirty="0"/>
+          </a:p>
+        </p:txBody>
+      </p:sp>
+      <p:sp>
+        <p:nvSpPr>
+          <p:cNvPr id="5" name="Foliennummernplatzhalter 4"/>
+          <p:cNvSpPr>
+            <a:spLocks noGrp="1"/>
+          </p:cNvSpPr>
+          <p:nvPr>
+            <p:ph type="sldNum" sz="quarter" idx="12"/>
+          </p:nvPr>
+        </p:nvSpPr>
+        <p:spPr/>
+        <p:txBody>
+          <a:bodyPr/>
+          <a:lstStyle/>
+          <a:p>
+            <a:fld id="{C2A96E4E-EC3F-424D-8211-F17AF9FC0446}" type="slidenum">
+              <a:rPr lang="de-DE" smtClean="0"/>
+              <a:pPr/>
+              <a:t>6</a:t>
             </a:fld>
             <a:endParaRPr lang="de-DE" dirty="0"/>
           </a:p>
@@ -21133,7 +22239,7 @@
 </p:sld>
 </file>
 
-<file path=ppt/slides/slide12.xml><?xml version="1.0" encoding="utf-8"?>
+<file path=ppt/slides/slide8.xml><?xml version="1.0" encoding="utf-8"?>
 <p:sld xmlns:a="http://schemas.openxmlformats.org/drawingml/2006/main" xmlns:r="http://schemas.openxmlformats.org/officeDocument/2006/relationships" xmlns:p="http://schemas.openxmlformats.org/presentationml/2006/main">
   <p:cSld>
     <p:spTree>
@@ -21291,214 +22397,7 @@
             <a:fld id="{C2A96E4E-EC3F-424D-8211-F17AF9FC0446}" type="slidenum">
               <a:rPr lang="de-DE" smtClean="0"/>
               <a:pPr/>
-              <a:t>11</a:t>
-            </a:fld>
-            <a:endParaRPr lang="de-DE" dirty="0"/>
-          </a:p>
-        </p:txBody>
-      </p:sp>
-      <p:sp>
-        <p:nvSpPr>
-          <p:cNvPr id="6" name="Titel 5"/>
-          <p:cNvSpPr>
-            <a:spLocks noGrp="1"/>
-          </p:cNvSpPr>
-          <p:nvPr>
-            <p:ph type="title"/>
-          </p:nvPr>
-        </p:nvSpPr>
-        <p:spPr/>
-        <p:txBody>
-          <a:bodyPr/>
-          <a:lstStyle/>
-          <a:p>
-            <a:r>
-              <a:rPr lang="de-DE" dirty="0" smtClean="0"/>
-              <a:t>Persönliche Entwicklung</a:t>
-            </a:r>
-            <a:endParaRPr lang="de-DE" dirty="0"/>
-          </a:p>
-        </p:txBody>
-      </p:sp>
-    </p:spTree>
-    <p:extLst>
-      <p:ext uri="{BB962C8B-B14F-4D97-AF65-F5344CB8AC3E}">
-        <p14:creationId xmlns:p14="http://schemas.microsoft.com/office/powerpoint/2010/main" val="466494280"/>
-      </p:ext>
-    </p:extLst>
-  </p:cSld>
-  <p:clrMapOvr>
-    <a:masterClrMapping/>
-  </p:clrMapOvr>
-  <p:timing>
-    <p:tnLst>
-      <p:par>
-        <p:cTn id="1" dur="indefinite" restart="never" nodeType="tmRoot"/>
-      </p:par>
-    </p:tnLst>
-  </p:timing>
-</p:sld>
-</file>
-
-<file path=ppt/slides/slide13.xml><?xml version="1.0" encoding="utf-8"?>
-<p:sld xmlns:a="http://schemas.openxmlformats.org/drawingml/2006/main" xmlns:r="http://schemas.openxmlformats.org/officeDocument/2006/relationships" xmlns:p="http://schemas.openxmlformats.org/presentationml/2006/main">
-  <p:cSld>
-    <p:spTree>
-      <p:nvGrpSpPr>
-        <p:cNvPr id="1" name=""/>
-        <p:cNvGrpSpPr/>
-        <p:nvPr/>
-      </p:nvGrpSpPr>
-      <p:grpSpPr>
-        <a:xfrm>
-          <a:off x="0" y="0"/>
-          <a:ext cx="0" cy="0"/>
-          <a:chOff x="0" y="0"/>
-          <a:chExt cx="0" cy="0"/>
-        </a:xfrm>
-      </p:grpSpPr>
-      <p:sp>
-        <p:nvSpPr>
-          <p:cNvPr id="2" name="Vertikaler Textplatzhalter 1"/>
-          <p:cNvSpPr>
-            <a:spLocks noGrp="1"/>
-          </p:cNvSpPr>
-          <p:nvPr>
-            <p:ph type="body" orient="vert" idx="1"/>
-          </p:nvPr>
-        </p:nvSpPr>
-        <p:spPr/>
-        <p:txBody>
-          <a:bodyPr>
-            <a:normAutofit/>
-          </a:bodyPr>
-          <a:lstStyle/>
-          <a:p>
-            <a:pPr>
-              <a:lnSpc>
-                <a:spcPct val="110000"/>
-              </a:lnSpc>
-            </a:pPr>
-            <a:r>
-              <a:rPr lang="en-US" dirty="0" err="1" smtClean="0">
-                <a:latin typeface="+mn-lt"/>
-                <a:ea typeface="Roboto" panose="02000000000000000000" pitchFamily="2" charset="0"/>
-                <a:cs typeface="Roboto" panose="02000000000000000000" pitchFamily="2" charset="0"/>
-              </a:rPr>
-              <a:t>Selbst</a:t>
-            </a:r>
-            <a:r>
-              <a:rPr lang="en-US" dirty="0" smtClean="0">
-                <a:latin typeface="+mn-lt"/>
-                <a:ea typeface="Roboto" panose="02000000000000000000" pitchFamily="2" charset="0"/>
-                <a:cs typeface="Roboto" panose="02000000000000000000" pitchFamily="2" charset="0"/>
-              </a:rPr>
-              <a:t>- und </a:t>
-            </a:r>
-            <a:r>
-              <a:rPr lang="en-US" dirty="0" err="1" smtClean="0">
-                <a:latin typeface="+mn-lt"/>
-                <a:ea typeface="Roboto" panose="02000000000000000000" pitchFamily="2" charset="0"/>
-                <a:cs typeface="Roboto" panose="02000000000000000000" pitchFamily="2" charset="0"/>
-              </a:rPr>
-              <a:t>Zeitmanagement</a:t>
-            </a:r>
-            <a:endParaRPr lang="en-US" dirty="0" smtClean="0">
-              <a:latin typeface="+mn-lt"/>
-              <a:ea typeface="Roboto" panose="02000000000000000000" pitchFamily="2" charset="0"/>
-              <a:cs typeface="Roboto" panose="02000000000000000000" pitchFamily="2" charset="0"/>
-            </a:endParaRPr>
-          </a:p>
-          <a:p>
-            <a:pPr>
-              <a:lnSpc>
-                <a:spcPct val="110000"/>
-              </a:lnSpc>
-            </a:pPr>
-            <a:r>
-              <a:rPr lang="en-US" dirty="0" smtClean="0">
-                <a:latin typeface="+mn-lt"/>
-                <a:ea typeface="Roboto" panose="02000000000000000000" pitchFamily="2" charset="0"/>
-                <a:cs typeface="Roboto" panose="02000000000000000000" pitchFamily="2" charset="0"/>
-              </a:rPr>
-              <a:t>Tip10</a:t>
-            </a:r>
-          </a:p>
-        </p:txBody>
-      </p:sp>
-      <p:sp>
-        <p:nvSpPr>
-          <p:cNvPr id="3" name="Datumsplatzhalter 2"/>
-          <p:cNvSpPr>
-            <a:spLocks noGrp="1"/>
-          </p:cNvSpPr>
-          <p:nvPr>
-            <p:ph type="dt" sz="half" idx="10"/>
-          </p:nvPr>
-        </p:nvSpPr>
-        <p:spPr/>
-        <p:txBody>
-          <a:bodyPr/>
-          <a:lstStyle/>
-          <a:p>
-            <a:fld id="{22DC5AD6-A57E-4A83-84DC-685C8F7A0281}" type="datetime4">
-              <a:rPr lang="en-US" smtClean="0"/>
-              <a:t>August 6, 2021</a:t>
-            </a:fld>
-            <a:endParaRPr lang="de-DE" dirty="0"/>
-          </a:p>
-        </p:txBody>
-      </p:sp>
-      <p:sp>
-        <p:nvSpPr>
-          <p:cNvPr id="4" name="Fußzeilenplatzhalter 3"/>
-          <p:cNvSpPr>
-            <a:spLocks noGrp="1"/>
-          </p:cNvSpPr>
-          <p:nvPr>
-            <p:ph type="ftr" sz="quarter" idx="11"/>
-          </p:nvPr>
-        </p:nvSpPr>
-        <p:spPr/>
-        <p:txBody>
-          <a:bodyPr/>
-          <a:lstStyle/>
-          <a:p>
-            <a:r>
-              <a:rPr lang="de-DE" dirty="0" smtClean="0"/>
-              <a:t>Reiner </a:t>
-            </a:r>
-            <a:r>
-              <a:rPr lang="de-DE" dirty="0" err="1" smtClean="0"/>
-              <a:t>Lemoine</a:t>
-            </a:r>
-            <a:r>
-              <a:rPr lang="de-DE" dirty="0" smtClean="0"/>
-              <a:t> Institut</a:t>
-            </a:r>
-            <a:endParaRPr lang="de-DE" dirty="0"/>
-          </a:p>
-        </p:txBody>
-      </p:sp>
-      <p:sp>
-        <p:nvSpPr>
-          <p:cNvPr id="5" name="Foliennummernplatzhalter 4"/>
-          <p:cNvSpPr>
-            <a:spLocks noGrp="1"/>
-          </p:cNvSpPr>
-          <p:nvPr>
-            <p:ph type="sldNum" sz="quarter" idx="12"/>
-          </p:nvPr>
-        </p:nvSpPr>
-        <p:spPr/>
-        <p:txBody>
-          <a:bodyPr/>
-          <a:lstStyle/>
-          <a:p>
-            <a:fld id="{C2A96E4E-EC3F-424D-8211-F17AF9FC0446}" type="slidenum">
-              <a:rPr lang="de-DE" smtClean="0"/>
-              <a:pPr/>
-              <a:t>12</a:t>
+              <a:t>7</a:t>
             </a:fld>
             <a:endParaRPr lang="de-DE" dirty="0"/>
           </a:p>
@@ -21577,7 +22476,7 @@
 </p:sld>
 </file>
 
-<file path=ppt/slides/slide14.xml><?xml version="1.0" encoding="utf-8"?>
+<file path=ppt/slides/slide9.xml><?xml version="1.0" encoding="utf-8"?>
 <p:sld xmlns:a="http://schemas.openxmlformats.org/drawingml/2006/main" xmlns:r="http://schemas.openxmlformats.org/officeDocument/2006/relationships" xmlns:p="http://schemas.openxmlformats.org/presentationml/2006/main">
   <p:cSld>
     <p:spTree>
@@ -21708,7 +22607,7 @@
             <a:fld id="{C2A96E4E-EC3F-424D-8211-F17AF9FC0446}" type="slidenum">
               <a:rPr lang="de-DE" smtClean="0"/>
               <a:pPr/>
-              <a:t>13</a:t>
+              <a:t>8</a:t>
             </a:fld>
             <a:endParaRPr lang="de-DE" dirty="0"/>
           </a:p>
@@ -21771,2332 +22670,6 @@
     <p:extLst>
       <p:ext uri="{BB962C8B-B14F-4D97-AF65-F5344CB8AC3E}">
         <p14:creationId xmlns:p14="http://schemas.microsoft.com/office/powerpoint/2010/main" val="1432856026"/>
-      </p:ext>
-    </p:extLst>
-  </p:cSld>
-  <p:clrMapOvr>
-    <a:masterClrMapping/>
-  </p:clrMapOvr>
-  <p:timing>
-    <p:tnLst>
-      <p:par>
-        <p:cTn id="1" dur="indefinite" restart="never" nodeType="tmRoot"/>
-      </p:par>
-    </p:tnLst>
-  </p:timing>
-</p:sld>
-</file>
-
-<file path=ppt/slides/slide2.xml><?xml version="1.0" encoding="utf-8"?>
-<p:sld xmlns:a="http://schemas.openxmlformats.org/drawingml/2006/main" xmlns:r="http://schemas.openxmlformats.org/officeDocument/2006/relationships" xmlns:p="http://schemas.openxmlformats.org/presentationml/2006/main">
-  <p:cSld>
-    <p:spTree>
-      <p:nvGrpSpPr>
-        <p:cNvPr id="1" name=""/>
-        <p:cNvGrpSpPr/>
-        <p:nvPr/>
-      </p:nvGrpSpPr>
-      <p:grpSpPr>
-        <a:xfrm>
-          <a:off x="0" y="0"/>
-          <a:ext cx="0" cy="0"/>
-          <a:chOff x="0" y="0"/>
-          <a:chExt cx="0" cy="0"/>
-        </a:xfrm>
-      </p:grpSpPr>
-      <p:sp>
-        <p:nvSpPr>
-          <p:cNvPr id="2" name="Titel 1"/>
-          <p:cNvSpPr>
-            <a:spLocks noGrp="1"/>
-          </p:cNvSpPr>
-          <p:nvPr>
-            <p:ph type="title"/>
-          </p:nvPr>
-        </p:nvSpPr>
-        <p:spPr>
-          <a:xfrm>
-            <a:off x="628650" y="277630"/>
-            <a:ext cx="7902197" cy="521262"/>
-          </a:xfrm>
-        </p:spPr>
-        <p:txBody>
-          <a:bodyPr/>
-          <a:lstStyle/>
-          <a:p>
-            <a:r>
-              <a:rPr lang="de-DE" b="1" dirty="0" smtClean="0">
-                <a:latin typeface="Roboto" charset="0"/>
-                <a:ea typeface="Roboto" charset="0"/>
-                <a:cs typeface="Roboto" charset="0"/>
-              </a:rPr>
-              <a:t>Agenda</a:t>
-            </a:r>
-            <a:endParaRPr lang="de-DE" b="1" dirty="0">
-              <a:latin typeface="Roboto" charset="0"/>
-              <a:ea typeface="Roboto" charset="0"/>
-              <a:cs typeface="Roboto" charset="0"/>
-            </a:endParaRPr>
-          </a:p>
-        </p:txBody>
-      </p:sp>
-      <p:sp>
-        <p:nvSpPr>
-          <p:cNvPr id="4" name="Datumsplatzhalter 3"/>
-          <p:cNvSpPr>
-            <a:spLocks noGrp="1"/>
-          </p:cNvSpPr>
-          <p:nvPr>
-            <p:ph type="dt" sz="half" idx="10"/>
-          </p:nvPr>
-        </p:nvSpPr>
-        <p:spPr/>
-        <p:txBody>
-          <a:bodyPr/>
-          <a:lstStyle/>
-          <a:p>
-            <a:fld id="{B5753BF5-1BC6-4AD4-9648-6EA401ACBEDB}" type="datetime4">
-              <a:rPr lang="en-US" smtClean="0"/>
-              <a:t>August 6, 2021</a:t>
-            </a:fld>
-            <a:endParaRPr lang="de-DE" dirty="0"/>
-          </a:p>
-        </p:txBody>
-      </p:sp>
-      <p:sp>
-        <p:nvSpPr>
-          <p:cNvPr id="5" name="Fußzeilenplatzhalter 4"/>
-          <p:cNvSpPr>
-            <a:spLocks noGrp="1"/>
-          </p:cNvSpPr>
-          <p:nvPr>
-            <p:ph type="ftr" sz="quarter" idx="11"/>
-          </p:nvPr>
-        </p:nvSpPr>
-        <p:spPr/>
-        <p:txBody>
-          <a:bodyPr/>
-          <a:lstStyle/>
-          <a:p>
-            <a:r>
-              <a:rPr lang="de-DE" smtClean="0"/>
-              <a:t>Reiner Lemoine Institut</a:t>
-            </a:r>
-            <a:endParaRPr lang="de-DE" dirty="0"/>
-          </a:p>
-        </p:txBody>
-      </p:sp>
-      <p:sp>
-        <p:nvSpPr>
-          <p:cNvPr id="6" name="Foliennummernplatzhalter 5"/>
-          <p:cNvSpPr>
-            <a:spLocks noGrp="1"/>
-          </p:cNvSpPr>
-          <p:nvPr>
-            <p:ph type="sldNum" sz="quarter" idx="12"/>
-          </p:nvPr>
-        </p:nvSpPr>
-        <p:spPr/>
-        <p:txBody>
-          <a:bodyPr/>
-          <a:lstStyle/>
-          <a:p>
-            <a:fld id="{C2A96E4E-EC3F-424D-8211-F17AF9FC0446}" type="slidenum">
-              <a:rPr lang="de-DE" smtClean="0"/>
-              <a:pPr/>
-              <a:t>1</a:t>
-            </a:fld>
-            <a:endParaRPr lang="de-DE" dirty="0"/>
-          </a:p>
-        </p:txBody>
-      </p:sp>
-      <p:graphicFrame>
-        <p:nvGraphicFramePr>
-          <p:cNvPr id="7" name="Diagram 3"/>
-          <p:cNvGraphicFramePr>
-            <a:graphicFrameLocks/>
-          </p:cNvGraphicFramePr>
-          <p:nvPr>
-            <p:extLst>
-              <p:ext uri="{D42A27DB-BD31-4B8C-83A1-F6EECF244321}">
-                <p14:modId xmlns:p14="http://schemas.microsoft.com/office/powerpoint/2010/main" val="2923649328"/>
-              </p:ext>
-            </p:extLst>
-          </p:nvPr>
-        </p:nvGraphicFramePr>
-        <p:xfrm>
-          <a:off x="628650" y="979714"/>
-          <a:ext cx="8134350" cy="3744686"/>
-        </p:xfrm>
-        <a:graphic>
-          <a:graphicData uri="http://schemas.openxmlformats.org/drawingml/2006/diagram">
-            <dgm:relIds xmlns:dgm="http://schemas.openxmlformats.org/drawingml/2006/diagram" xmlns:r="http://schemas.openxmlformats.org/officeDocument/2006/relationships" r:dm="rId2" r:lo="rId3" r:qs="rId4" r:cs="rId5"/>
-          </a:graphicData>
-        </a:graphic>
-      </p:graphicFrame>
-    </p:spTree>
-    <p:extLst>
-      <p:ext uri="{BB962C8B-B14F-4D97-AF65-F5344CB8AC3E}">
-        <p14:creationId xmlns:p14="http://schemas.microsoft.com/office/powerpoint/2010/main" val="19975182"/>
-      </p:ext>
-    </p:extLst>
-  </p:cSld>
-  <p:clrMapOvr>
-    <a:masterClrMapping/>
-  </p:clrMapOvr>
-  <p:timing>
-    <p:tnLst>
-      <p:par>
-        <p:cTn id="1" dur="indefinite" restart="never" nodeType="tmRoot"/>
-      </p:par>
-    </p:tnLst>
-  </p:timing>
-</p:sld>
-</file>
-
-<file path=ppt/slides/slide3.xml><?xml version="1.0" encoding="utf-8"?>
-<p:sld xmlns:a="http://schemas.openxmlformats.org/drawingml/2006/main" xmlns:r="http://schemas.openxmlformats.org/officeDocument/2006/relationships" xmlns:p="http://schemas.openxmlformats.org/presentationml/2006/main">
-  <p:cSld>
-    <p:spTree>
-      <p:nvGrpSpPr>
-        <p:cNvPr id="1" name=""/>
-        <p:cNvGrpSpPr/>
-        <p:nvPr/>
-      </p:nvGrpSpPr>
-      <p:grpSpPr>
-        <a:xfrm>
-          <a:off x="0" y="0"/>
-          <a:ext cx="0" cy="0"/>
-          <a:chOff x="0" y="0"/>
-          <a:chExt cx="0" cy="0"/>
-        </a:xfrm>
-      </p:grpSpPr>
-      <p:sp>
-        <p:nvSpPr>
-          <p:cNvPr id="2" name="Vertikaler Textplatzhalter 1"/>
-          <p:cNvSpPr>
-            <a:spLocks noGrp="1"/>
-          </p:cNvSpPr>
-          <p:nvPr>
-            <p:ph type="body" orient="vert" idx="1"/>
-          </p:nvPr>
-        </p:nvSpPr>
-        <p:spPr/>
-        <p:txBody>
-          <a:bodyPr>
-            <a:normAutofit/>
-          </a:bodyPr>
-          <a:lstStyle/>
-          <a:p>
-            <a:pPr marL="0" indent="0">
-              <a:lnSpc>
-                <a:spcPct val="110000"/>
-              </a:lnSpc>
-              <a:buNone/>
-            </a:pPr>
-            <a:r>
-              <a:rPr lang="en-US" b="1" dirty="0" smtClean="0">
-                <a:latin typeface="Roboto" panose="02000000000000000000" pitchFamily="2" charset="0"/>
-                <a:ea typeface="Roboto" panose="02000000000000000000" pitchFamily="2" charset="0"/>
-                <a:cs typeface="Roboto" panose="02000000000000000000" pitchFamily="2" charset="0"/>
-              </a:rPr>
-              <a:t>           </a:t>
-            </a:r>
-          </a:p>
-          <a:p>
-            <a:pPr marL="0" indent="0">
-              <a:lnSpc>
-                <a:spcPct val="110000"/>
-              </a:lnSpc>
-              <a:buNone/>
-            </a:pPr>
-            <a:r>
-              <a:rPr lang="en-US" dirty="0" err="1" smtClean="0">
-                <a:latin typeface="+mn-lt"/>
-                <a:ea typeface="Roboto" panose="02000000000000000000" pitchFamily="2" charset="0"/>
-                <a:cs typeface="Roboto" panose="02000000000000000000" pitchFamily="2" charset="0"/>
-              </a:rPr>
-              <a:t>Begrüßung</a:t>
-            </a:r>
-            <a:endParaRPr lang="en-US" dirty="0" smtClean="0">
-              <a:latin typeface="+mn-lt"/>
-              <a:ea typeface="Roboto" panose="02000000000000000000" pitchFamily="2" charset="0"/>
-              <a:cs typeface="Roboto" panose="02000000000000000000" pitchFamily="2" charset="0"/>
-            </a:endParaRPr>
-          </a:p>
-          <a:p>
-            <a:pPr marL="0" indent="0">
-              <a:lnSpc>
-                <a:spcPct val="110000"/>
-              </a:lnSpc>
-              <a:buNone/>
-            </a:pPr>
-            <a:endParaRPr lang="en-US" b="1" dirty="0">
-              <a:latin typeface="Roboto" panose="02000000000000000000" pitchFamily="2" charset="0"/>
-              <a:ea typeface="Roboto" panose="02000000000000000000" pitchFamily="2" charset="0"/>
-              <a:cs typeface="Roboto" panose="02000000000000000000" pitchFamily="2" charset="0"/>
-            </a:endParaRPr>
-          </a:p>
-          <a:p>
-            <a:pPr marL="0" indent="0">
-              <a:lnSpc>
-                <a:spcPct val="110000"/>
-              </a:lnSpc>
-              <a:buNone/>
-            </a:pPr>
-            <a:r>
-              <a:rPr lang="en-US" b="1" dirty="0" smtClean="0">
-                <a:latin typeface="Roboto" panose="02000000000000000000" pitchFamily="2" charset="0"/>
-                <a:ea typeface="Roboto" panose="02000000000000000000" pitchFamily="2" charset="0"/>
-                <a:cs typeface="Roboto" panose="02000000000000000000" pitchFamily="2" charset="0"/>
-              </a:rPr>
-              <a:t>      				</a:t>
-            </a:r>
-            <a:r>
-              <a:rPr lang="en-US" dirty="0" err="1" smtClean="0">
-                <a:latin typeface="Roboto Light" panose="02000000000000000000" pitchFamily="2" charset="0"/>
-                <a:ea typeface="Roboto Light" panose="02000000000000000000" pitchFamily="2" charset="0"/>
-                <a:cs typeface="Roboto Light" panose="02000000000000000000" pitchFamily="2" charset="0"/>
-              </a:rPr>
-              <a:t>Checkliste</a:t>
-            </a:r>
-            <a:endParaRPr lang="en-US" dirty="0" smtClean="0">
-              <a:latin typeface="Roboto Light" panose="02000000000000000000" pitchFamily="2" charset="0"/>
-              <a:ea typeface="Roboto Light" panose="02000000000000000000" pitchFamily="2" charset="0"/>
-              <a:cs typeface="Roboto Light" panose="02000000000000000000" pitchFamily="2" charset="0"/>
-            </a:endParaRPr>
-          </a:p>
-          <a:p>
-            <a:pPr marL="0" indent="0">
-              <a:lnSpc>
-                <a:spcPct val="110000"/>
-              </a:lnSpc>
-              <a:buNone/>
-            </a:pPr>
-            <a:endParaRPr lang="en-US" b="1" dirty="0">
-              <a:latin typeface="Roboto" panose="02000000000000000000" pitchFamily="2" charset="0"/>
-              <a:ea typeface="Roboto" panose="02000000000000000000" pitchFamily="2" charset="0"/>
-              <a:cs typeface="Roboto" panose="02000000000000000000" pitchFamily="2" charset="0"/>
-            </a:endParaRPr>
-          </a:p>
-          <a:p>
-            <a:pPr marL="0" indent="0">
-              <a:lnSpc>
-                <a:spcPct val="110000"/>
-              </a:lnSpc>
-              <a:buNone/>
-            </a:pPr>
-            <a:r>
-              <a:rPr lang="en-US" b="1" dirty="0" smtClean="0">
-                <a:latin typeface="Roboto" panose="02000000000000000000" pitchFamily="2" charset="0"/>
-                <a:ea typeface="Roboto" panose="02000000000000000000" pitchFamily="2" charset="0"/>
-                <a:cs typeface="Roboto" panose="02000000000000000000" pitchFamily="2" charset="0"/>
-              </a:rPr>
-              <a:t>                            					    </a:t>
-            </a:r>
-            <a:r>
-              <a:rPr lang="en-US" dirty="0" err="1" smtClean="0">
-                <a:latin typeface="Roboto Light" panose="02000000000000000000" pitchFamily="2" charset="0"/>
-                <a:ea typeface="Roboto Light" panose="02000000000000000000" pitchFamily="2" charset="0"/>
-                <a:cs typeface="Roboto Light" panose="02000000000000000000" pitchFamily="2" charset="0"/>
-              </a:rPr>
-              <a:t>Tagebuch</a:t>
-            </a:r>
-            <a:endParaRPr lang="en-US" dirty="0">
-              <a:latin typeface="Roboto Light" panose="02000000000000000000" pitchFamily="2" charset="0"/>
-              <a:ea typeface="Roboto Light" panose="02000000000000000000" pitchFamily="2" charset="0"/>
-              <a:cs typeface="Roboto Light" panose="02000000000000000000" pitchFamily="2" charset="0"/>
-            </a:endParaRPr>
-          </a:p>
-        </p:txBody>
-      </p:sp>
-      <p:sp>
-        <p:nvSpPr>
-          <p:cNvPr id="3" name="Datumsplatzhalter 2"/>
-          <p:cNvSpPr>
-            <a:spLocks noGrp="1"/>
-          </p:cNvSpPr>
-          <p:nvPr>
-            <p:ph type="dt" sz="half" idx="10"/>
-          </p:nvPr>
-        </p:nvSpPr>
-        <p:spPr/>
-        <p:txBody>
-          <a:bodyPr/>
-          <a:lstStyle/>
-          <a:p>
-            <a:fld id="{22DC5AD6-A57E-4A83-84DC-685C8F7A0281}" type="datetime4">
-              <a:rPr lang="en-US" smtClean="0"/>
-              <a:t>August 6, 2021</a:t>
-            </a:fld>
-            <a:endParaRPr lang="de-DE" dirty="0"/>
-          </a:p>
-        </p:txBody>
-      </p:sp>
-      <p:sp>
-        <p:nvSpPr>
-          <p:cNvPr id="4" name="Fußzeilenplatzhalter 3"/>
-          <p:cNvSpPr>
-            <a:spLocks noGrp="1"/>
-          </p:cNvSpPr>
-          <p:nvPr>
-            <p:ph type="ftr" sz="quarter" idx="11"/>
-          </p:nvPr>
-        </p:nvSpPr>
-        <p:spPr/>
-        <p:txBody>
-          <a:bodyPr/>
-          <a:lstStyle/>
-          <a:p>
-            <a:r>
-              <a:rPr lang="de-DE" smtClean="0"/>
-              <a:t>Reiner Lemoine Institut</a:t>
-            </a:r>
-            <a:endParaRPr lang="de-DE" dirty="0"/>
-          </a:p>
-        </p:txBody>
-      </p:sp>
-      <p:sp>
-        <p:nvSpPr>
-          <p:cNvPr id="5" name="Foliennummernplatzhalter 4"/>
-          <p:cNvSpPr>
-            <a:spLocks noGrp="1"/>
-          </p:cNvSpPr>
-          <p:nvPr>
-            <p:ph type="sldNum" sz="quarter" idx="12"/>
-          </p:nvPr>
-        </p:nvSpPr>
-        <p:spPr/>
-        <p:txBody>
-          <a:bodyPr/>
-          <a:lstStyle/>
-          <a:p>
-            <a:fld id="{C2A96E4E-EC3F-424D-8211-F17AF9FC0446}" type="slidenum">
-              <a:rPr lang="de-DE" smtClean="0"/>
-              <a:pPr/>
-              <a:t>2</a:t>
-            </a:fld>
-            <a:endParaRPr lang="de-DE" dirty="0"/>
-          </a:p>
-        </p:txBody>
-      </p:sp>
-      <p:sp>
-        <p:nvSpPr>
-          <p:cNvPr id="6" name="Titel 5"/>
-          <p:cNvSpPr>
-            <a:spLocks noGrp="1"/>
-          </p:cNvSpPr>
-          <p:nvPr>
-            <p:ph type="title"/>
-          </p:nvPr>
-        </p:nvSpPr>
-        <p:spPr/>
-        <p:txBody>
-          <a:bodyPr/>
-          <a:lstStyle/>
-          <a:p>
-            <a:r>
-              <a:rPr lang="de-DE" dirty="0" smtClean="0"/>
-              <a:t>Einfindung</a:t>
-            </a:r>
-            <a:endParaRPr lang="de-DE" dirty="0"/>
-          </a:p>
-        </p:txBody>
-      </p:sp>
-      <p:cxnSp>
-        <p:nvCxnSpPr>
-          <p:cNvPr id="8" name="Gerade Verbindung mit Pfeil 7"/>
-          <p:cNvCxnSpPr/>
-          <p:nvPr/>
-        </p:nvCxnSpPr>
-        <p:spPr>
-          <a:xfrm>
-            <a:off x="1465011" y="2091745"/>
-            <a:ext cx="1563939" cy="491884"/>
-          </a:xfrm>
-          <a:prstGeom prst="straightConnector1">
-            <a:avLst/>
-          </a:prstGeom>
-          <a:ln w="12700">
-            <a:solidFill>
-              <a:srgbClr val="002E50"/>
-            </a:solidFill>
-            <a:tailEnd type="triangle"/>
-          </a:ln>
-        </p:spPr>
-        <p:style>
-          <a:lnRef idx="1">
-            <a:schemeClr val="accent1"/>
-          </a:lnRef>
-          <a:fillRef idx="0">
-            <a:schemeClr val="accent1"/>
-          </a:fillRef>
-          <a:effectRef idx="0">
-            <a:schemeClr val="accent1"/>
-          </a:effectRef>
-          <a:fontRef idx="minor">
-            <a:schemeClr val="tx1"/>
-          </a:fontRef>
-        </p:style>
-      </p:cxnSp>
-      <p:cxnSp>
-        <p:nvCxnSpPr>
-          <p:cNvPr id="10" name="Gerade Verbindung mit Pfeil 9"/>
-          <p:cNvCxnSpPr/>
-          <p:nvPr/>
-        </p:nvCxnSpPr>
-        <p:spPr>
-          <a:xfrm>
-            <a:off x="4379530" y="3045033"/>
-            <a:ext cx="1563939" cy="491884"/>
-          </a:xfrm>
-          <a:prstGeom prst="straightConnector1">
-            <a:avLst/>
-          </a:prstGeom>
-          <a:ln w="12700">
-            <a:solidFill>
-              <a:srgbClr val="002E50"/>
-            </a:solidFill>
-            <a:tailEnd type="triangle"/>
-          </a:ln>
-        </p:spPr>
-        <p:style>
-          <a:lnRef idx="1">
-            <a:schemeClr val="accent1"/>
-          </a:lnRef>
-          <a:fillRef idx="0">
-            <a:schemeClr val="accent1"/>
-          </a:fillRef>
-          <a:effectRef idx="0">
-            <a:schemeClr val="accent1"/>
-          </a:effectRef>
-          <a:fontRef idx="minor">
-            <a:schemeClr val="tx1"/>
-          </a:fontRef>
-        </p:style>
-      </p:cxnSp>
-    </p:spTree>
-    <p:extLst>
-      <p:ext uri="{BB962C8B-B14F-4D97-AF65-F5344CB8AC3E}">
-        <p14:creationId xmlns:p14="http://schemas.microsoft.com/office/powerpoint/2010/main" val="1847067565"/>
-      </p:ext>
-    </p:extLst>
-  </p:cSld>
-  <p:clrMapOvr>
-    <a:masterClrMapping/>
-  </p:clrMapOvr>
-  <p:timing>
-    <p:tnLst>
-      <p:par>
-        <p:cTn id="1" dur="indefinite" restart="never" nodeType="tmRoot"/>
-      </p:par>
-    </p:tnLst>
-  </p:timing>
-</p:sld>
-</file>
-
-<file path=ppt/slides/slide4.xml><?xml version="1.0" encoding="utf-8"?>
-<p:sld xmlns:a="http://schemas.openxmlformats.org/drawingml/2006/main" xmlns:r="http://schemas.openxmlformats.org/officeDocument/2006/relationships" xmlns:p="http://schemas.openxmlformats.org/presentationml/2006/main">
-  <p:cSld>
-    <p:spTree>
-      <p:nvGrpSpPr>
-        <p:cNvPr id="1" name=""/>
-        <p:cNvGrpSpPr/>
-        <p:nvPr/>
-      </p:nvGrpSpPr>
-      <p:grpSpPr>
-        <a:xfrm>
-          <a:off x="0" y="0"/>
-          <a:ext cx="0" cy="0"/>
-          <a:chOff x="0" y="0"/>
-          <a:chExt cx="0" cy="0"/>
-        </a:xfrm>
-      </p:grpSpPr>
-      <p:sp>
-        <p:nvSpPr>
-          <p:cNvPr id="2" name="Vertikaler Textplatzhalter 1"/>
-          <p:cNvSpPr>
-            <a:spLocks noGrp="1"/>
-          </p:cNvSpPr>
-          <p:nvPr>
-            <p:ph type="body" orient="vert" idx="1"/>
-          </p:nvPr>
-        </p:nvSpPr>
-        <p:spPr/>
-        <p:txBody>
-          <a:bodyPr>
-            <a:normAutofit/>
-          </a:bodyPr>
-          <a:lstStyle/>
-          <a:p>
-            <a:pPr marL="0" indent="0">
-              <a:lnSpc>
-                <a:spcPct val="110000"/>
-              </a:lnSpc>
-              <a:buNone/>
-            </a:pPr>
-            <a:r>
-              <a:rPr lang="en-US" b="1" dirty="0" smtClean="0">
-                <a:latin typeface="Roboto" panose="02000000000000000000" pitchFamily="2" charset="0"/>
-                <a:ea typeface="Roboto" panose="02000000000000000000" pitchFamily="2" charset="0"/>
-                <a:cs typeface="Roboto" panose="02000000000000000000" pitchFamily="2" charset="0"/>
-              </a:rPr>
-              <a:t>           </a:t>
-            </a:r>
-          </a:p>
-          <a:p>
-            <a:pPr marL="0" indent="0">
-              <a:lnSpc>
-                <a:spcPct val="110000"/>
-              </a:lnSpc>
-              <a:buNone/>
-            </a:pPr>
-            <a:r>
-              <a:rPr lang="en-US" dirty="0" err="1" smtClean="0">
-                <a:latin typeface="+mn-lt"/>
-                <a:ea typeface="Roboto" panose="02000000000000000000" pitchFamily="2" charset="0"/>
-                <a:cs typeface="Roboto" panose="02000000000000000000" pitchFamily="2" charset="0"/>
-              </a:rPr>
-              <a:t>Begrüßung</a:t>
-            </a:r>
-            <a:endParaRPr lang="en-US" dirty="0" smtClean="0">
-              <a:latin typeface="+mn-lt"/>
-              <a:ea typeface="Roboto" panose="02000000000000000000" pitchFamily="2" charset="0"/>
-              <a:cs typeface="Roboto" panose="02000000000000000000" pitchFamily="2" charset="0"/>
-            </a:endParaRPr>
-          </a:p>
-          <a:p>
-            <a:pPr marL="0" indent="0">
-              <a:lnSpc>
-                <a:spcPct val="110000"/>
-              </a:lnSpc>
-              <a:buNone/>
-            </a:pPr>
-            <a:endParaRPr lang="en-US" b="1" dirty="0">
-              <a:latin typeface="Roboto" panose="02000000000000000000" pitchFamily="2" charset="0"/>
-              <a:ea typeface="Roboto" panose="02000000000000000000" pitchFamily="2" charset="0"/>
-              <a:cs typeface="Roboto" panose="02000000000000000000" pitchFamily="2" charset="0"/>
-            </a:endParaRPr>
-          </a:p>
-          <a:p>
-            <a:pPr marL="0" indent="0">
-              <a:lnSpc>
-                <a:spcPct val="110000"/>
-              </a:lnSpc>
-              <a:buNone/>
-            </a:pPr>
-            <a:r>
-              <a:rPr lang="en-US" b="1" dirty="0" smtClean="0">
-                <a:latin typeface="Roboto" panose="02000000000000000000" pitchFamily="2" charset="0"/>
-                <a:ea typeface="Roboto" panose="02000000000000000000" pitchFamily="2" charset="0"/>
-                <a:cs typeface="Roboto" panose="02000000000000000000" pitchFamily="2" charset="0"/>
-              </a:rPr>
-              <a:t>      				</a:t>
-            </a:r>
-            <a:r>
-              <a:rPr lang="en-US" dirty="0" err="1" smtClean="0">
-                <a:latin typeface="Roboto Light" panose="02000000000000000000" pitchFamily="2" charset="0"/>
-                <a:ea typeface="Roboto Light" panose="02000000000000000000" pitchFamily="2" charset="0"/>
-                <a:cs typeface="Roboto Light" panose="02000000000000000000" pitchFamily="2" charset="0"/>
-              </a:rPr>
-              <a:t>Checkliste</a:t>
-            </a:r>
-            <a:endParaRPr lang="en-US" dirty="0" smtClean="0">
-              <a:latin typeface="Roboto Light" panose="02000000000000000000" pitchFamily="2" charset="0"/>
-              <a:ea typeface="Roboto Light" panose="02000000000000000000" pitchFamily="2" charset="0"/>
-              <a:cs typeface="Roboto Light" panose="02000000000000000000" pitchFamily="2" charset="0"/>
-            </a:endParaRPr>
-          </a:p>
-          <a:p>
-            <a:pPr marL="0" indent="0">
-              <a:lnSpc>
-                <a:spcPct val="110000"/>
-              </a:lnSpc>
-              <a:buNone/>
-            </a:pPr>
-            <a:endParaRPr lang="en-US" b="1" dirty="0">
-              <a:latin typeface="Roboto" panose="02000000000000000000" pitchFamily="2" charset="0"/>
-              <a:ea typeface="Roboto" panose="02000000000000000000" pitchFamily="2" charset="0"/>
-              <a:cs typeface="Roboto" panose="02000000000000000000" pitchFamily="2" charset="0"/>
-            </a:endParaRPr>
-          </a:p>
-          <a:p>
-            <a:pPr marL="0" indent="0">
-              <a:lnSpc>
-                <a:spcPct val="110000"/>
-              </a:lnSpc>
-              <a:buNone/>
-            </a:pPr>
-            <a:r>
-              <a:rPr lang="en-US" b="1" dirty="0" smtClean="0">
-                <a:latin typeface="Roboto" panose="02000000000000000000" pitchFamily="2" charset="0"/>
-                <a:ea typeface="Roboto" panose="02000000000000000000" pitchFamily="2" charset="0"/>
-                <a:cs typeface="Roboto" panose="02000000000000000000" pitchFamily="2" charset="0"/>
-              </a:rPr>
-              <a:t>                            					    </a:t>
-            </a:r>
-            <a:r>
-              <a:rPr lang="en-US" dirty="0" err="1" smtClean="0">
-                <a:latin typeface="Roboto Light" panose="02000000000000000000" pitchFamily="2" charset="0"/>
-                <a:ea typeface="Roboto Light" panose="02000000000000000000" pitchFamily="2" charset="0"/>
-                <a:cs typeface="Roboto Light" panose="02000000000000000000" pitchFamily="2" charset="0"/>
-              </a:rPr>
-              <a:t>Tagebuch</a:t>
-            </a:r>
-            <a:endParaRPr lang="en-US" dirty="0">
-              <a:latin typeface="Roboto Light" panose="02000000000000000000" pitchFamily="2" charset="0"/>
-              <a:ea typeface="Roboto Light" panose="02000000000000000000" pitchFamily="2" charset="0"/>
-              <a:cs typeface="Roboto Light" panose="02000000000000000000" pitchFamily="2" charset="0"/>
-            </a:endParaRPr>
-          </a:p>
-        </p:txBody>
-      </p:sp>
-      <p:sp>
-        <p:nvSpPr>
-          <p:cNvPr id="3" name="Datumsplatzhalter 2"/>
-          <p:cNvSpPr>
-            <a:spLocks noGrp="1"/>
-          </p:cNvSpPr>
-          <p:nvPr>
-            <p:ph type="dt" sz="half" idx="10"/>
-          </p:nvPr>
-        </p:nvSpPr>
-        <p:spPr/>
-        <p:txBody>
-          <a:bodyPr/>
-          <a:lstStyle/>
-          <a:p>
-            <a:fld id="{22DC5AD6-A57E-4A83-84DC-685C8F7A0281}" type="datetime4">
-              <a:rPr lang="en-US" smtClean="0"/>
-              <a:t>August 6, 2021</a:t>
-            </a:fld>
-            <a:endParaRPr lang="de-DE" dirty="0"/>
-          </a:p>
-        </p:txBody>
-      </p:sp>
-      <p:sp>
-        <p:nvSpPr>
-          <p:cNvPr id="4" name="Fußzeilenplatzhalter 3"/>
-          <p:cNvSpPr>
-            <a:spLocks noGrp="1"/>
-          </p:cNvSpPr>
-          <p:nvPr>
-            <p:ph type="ftr" sz="quarter" idx="11"/>
-          </p:nvPr>
-        </p:nvSpPr>
-        <p:spPr/>
-        <p:txBody>
-          <a:bodyPr/>
-          <a:lstStyle/>
-          <a:p>
-            <a:r>
-              <a:rPr lang="de-DE" smtClean="0"/>
-              <a:t>Reiner Lemoine Institut</a:t>
-            </a:r>
-            <a:endParaRPr lang="de-DE" dirty="0"/>
-          </a:p>
-        </p:txBody>
-      </p:sp>
-      <p:sp>
-        <p:nvSpPr>
-          <p:cNvPr id="5" name="Foliennummernplatzhalter 4"/>
-          <p:cNvSpPr>
-            <a:spLocks noGrp="1"/>
-          </p:cNvSpPr>
-          <p:nvPr>
-            <p:ph type="sldNum" sz="quarter" idx="12"/>
-          </p:nvPr>
-        </p:nvSpPr>
-        <p:spPr/>
-        <p:txBody>
-          <a:bodyPr/>
-          <a:lstStyle/>
-          <a:p>
-            <a:fld id="{C2A96E4E-EC3F-424D-8211-F17AF9FC0446}" type="slidenum">
-              <a:rPr lang="de-DE" smtClean="0"/>
-              <a:pPr/>
-              <a:t>3</a:t>
-            </a:fld>
-            <a:endParaRPr lang="de-DE" dirty="0"/>
-          </a:p>
-        </p:txBody>
-      </p:sp>
-      <p:sp>
-        <p:nvSpPr>
-          <p:cNvPr id="6" name="Titel 5"/>
-          <p:cNvSpPr>
-            <a:spLocks noGrp="1"/>
-          </p:cNvSpPr>
-          <p:nvPr>
-            <p:ph type="title"/>
-          </p:nvPr>
-        </p:nvSpPr>
-        <p:spPr/>
-        <p:txBody>
-          <a:bodyPr/>
-          <a:lstStyle/>
-          <a:p>
-            <a:r>
-              <a:rPr lang="de-DE" dirty="0" smtClean="0"/>
-              <a:t>Einfindung</a:t>
-            </a:r>
-            <a:endParaRPr lang="de-DE" dirty="0"/>
-          </a:p>
-        </p:txBody>
-      </p:sp>
-      <p:cxnSp>
-        <p:nvCxnSpPr>
-          <p:cNvPr id="8" name="Gerade Verbindung mit Pfeil 7"/>
-          <p:cNvCxnSpPr/>
-          <p:nvPr/>
-        </p:nvCxnSpPr>
-        <p:spPr>
-          <a:xfrm>
-            <a:off x="1465011" y="2091745"/>
-            <a:ext cx="1563939" cy="491884"/>
-          </a:xfrm>
-          <a:prstGeom prst="straightConnector1">
-            <a:avLst/>
-          </a:prstGeom>
-          <a:ln w="12700">
-            <a:solidFill>
-              <a:srgbClr val="002E50"/>
-            </a:solidFill>
-            <a:tailEnd type="triangle"/>
-          </a:ln>
-        </p:spPr>
-        <p:style>
-          <a:lnRef idx="1">
-            <a:schemeClr val="accent1"/>
-          </a:lnRef>
-          <a:fillRef idx="0">
-            <a:schemeClr val="accent1"/>
-          </a:fillRef>
-          <a:effectRef idx="0">
-            <a:schemeClr val="accent1"/>
-          </a:effectRef>
-          <a:fontRef idx="minor">
-            <a:schemeClr val="tx1"/>
-          </a:fontRef>
-        </p:style>
-      </p:cxnSp>
-      <p:cxnSp>
-        <p:nvCxnSpPr>
-          <p:cNvPr id="10" name="Gerade Verbindung mit Pfeil 9"/>
-          <p:cNvCxnSpPr/>
-          <p:nvPr/>
-        </p:nvCxnSpPr>
-        <p:spPr>
-          <a:xfrm>
-            <a:off x="4379530" y="3045033"/>
-            <a:ext cx="1563939" cy="491884"/>
-          </a:xfrm>
-          <a:prstGeom prst="straightConnector1">
-            <a:avLst/>
-          </a:prstGeom>
-          <a:ln w="12700">
-            <a:solidFill>
-              <a:srgbClr val="002E50"/>
-            </a:solidFill>
-            <a:tailEnd type="triangle"/>
-          </a:ln>
-        </p:spPr>
-        <p:style>
-          <a:lnRef idx="1">
-            <a:schemeClr val="accent1"/>
-          </a:lnRef>
-          <a:fillRef idx="0">
-            <a:schemeClr val="accent1"/>
-          </a:fillRef>
-          <a:effectRef idx="0">
-            <a:schemeClr val="accent1"/>
-          </a:effectRef>
-          <a:fontRef idx="minor">
-            <a:schemeClr val="tx1"/>
-          </a:fontRef>
-        </p:style>
-      </p:cxnSp>
-      <p:pic>
-        <p:nvPicPr>
-          <p:cNvPr id="12" name="Grafik 11"/>
-          <p:cNvPicPr>
-            <a:picLocks noChangeAspect="1"/>
-          </p:cNvPicPr>
-          <p:nvPr/>
-        </p:nvPicPr>
-        <p:blipFill>
-          <a:blip r:embed="rId2"/>
-          <a:stretch>
-            <a:fillRect/>
-          </a:stretch>
-        </p:blipFill>
-        <p:spPr>
-          <a:xfrm>
-            <a:off x="5704691" y="924496"/>
-            <a:ext cx="2134782" cy="2209058"/>
-          </a:xfrm>
-          <a:prstGeom prst="rect">
-            <a:avLst/>
-          </a:prstGeom>
-        </p:spPr>
-      </p:pic>
-    </p:spTree>
-    <p:extLst>
-      <p:ext uri="{BB962C8B-B14F-4D97-AF65-F5344CB8AC3E}">
-        <p14:creationId xmlns:p14="http://schemas.microsoft.com/office/powerpoint/2010/main" val="2448433791"/>
-      </p:ext>
-    </p:extLst>
-  </p:cSld>
-  <p:clrMapOvr>
-    <a:masterClrMapping/>
-  </p:clrMapOvr>
-  <p:timing>
-    <p:tnLst>
-      <p:par>
-        <p:cTn id="1" dur="indefinite" restart="never" nodeType="tmRoot"/>
-      </p:par>
-    </p:tnLst>
-  </p:timing>
-</p:sld>
-</file>
-
-<file path=ppt/slides/slide5.xml><?xml version="1.0" encoding="utf-8"?>
-<p:sld xmlns:a="http://schemas.openxmlformats.org/drawingml/2006/main" xmlns:r="http://schemas.openxmlformats.org/officeDocument/2006/relationships" xmlns:p="http://schemas.openxmlformats.org/presentationml/2006/main">
-  <p:cSld>
-    <p:spTree>
-      <p:nvGrpSpPr>
-        <p:cNvPr id="1" name=""/>
-        <p:cNvGrpSpPr/>
-        <p:nvPr/>
-      </p:nvGrpSpPr>
-      <p:grpSpPr>
-        <a:xfrm>
-          <a:off x="0" y="0"/>
-          <a:ext cx="0" cy="0"/>
-          <a:chOff x="0" y="0"/>
-          <a:chExt cx="0" cy="0"/>
-        </a:xfrm>
-      </p:grpSpPr>
-      <p:sp>
-        <p:nvSpPr>
-          <p:cNvPr id="2" name="Vertikaler Textplatzhalter 1"/>
-          <p:cNvSpPr>
-            <a:spLocks noGrp="1"/>
-          </p:cNvSpPr>
-          <p:nvPr>
-            <p:ph type="body" orient="vert" idx="1"/>
-          </p:nvPr>
-        </p:nvSpPr>
-        <p:spPr/>
-        <p:txBody>
-          <a:bodyPr>
-            <a:normAutofit/>
-          </a:bodyPr>
-          <a:lstStyle/>
-          <a:p>
-            <a:pPr marL="0" indent="0">
-              <a:lnSpc>
-                <a:spcPct val="110000"/>
-              </a:lnSpc>
-              <a:buNone/>
-            </a:pPr>
-            <a:r>
-              <a:rPr lang="en-US" b="1" dirty="0" smtClean="0">
-                <a:latin typeface="Roboto" panose="02000000000000000000" pitchFamily="2" charset="0"/>
-                <a:ea typeface="Roboto" panose="02000000000000000000" pitchFamily="2" charset="0"/>
-                <a:cs typeface="Roboto" panose="02000000000000000000" pitchFamily="2" charset="0"/>
-              </a:rPr>
-              <a:t>           </a:t>
-            </a:r>
-          </a:p>
-          <a:p>
-            <a:pPr marL="0" indent="0">
-              <a:lnSpc>
-                <a:spcPct val="110000"/>
-              </a:lnSpc>
-              <a:buNone/>
-            </a:pPr>
-            <a:r>
-              <a:rPr lang="en-US" dirty="0" err="1" smtClean="0">
-                <a:latin typeface="+mn-lt"/>
-                <a:ea typeface="Roboto" panose="02000000000000000000" pitchFamily="2" charset="0"/>
-                <a:cs typeface="Roboto" panose="02000000000000000000" pitchFamily="2" charset="0"/>
-              </a:rPr>
-              <a:t>Begrüßung</a:t>
-            </a:r>
-            <a:endParaRPr lang="en-US" dirty="0" smtClean="0">
-              <a:latin typeface="+mn-lt"/>
-              <a:ea typeface="Roboto" panose="02000000000000000000" pitchFamily="2" charset="0"/>
-              <a:cs typeface="Roboto" panose="02000000000000000000" pitchFamily="2" charset="0"/>
-            </a:endParaRPr>
-          </a:p>
-          <a:p>
-            <a:pPr marL="0" indent="0">
-              <a:lnSpc>
-                <a:spcPct val="110000"/>
-              </a:lnSpc>
-              <a:buNone/>
-            </a:pPr>
-            <a:endParaRPr lang="en-US" b="1" dirty="0">
-              <a:latin typeface="Roboto" panose="02000000000000000000" pitchFamily="2" charset="0"/>
-              <a:ea typeface="Roboto" panose="02000000000000000000" pitchFamily="2" charset="0"/>
-              <a:cs typeface="Roboto" panose="02000000000000000000" pitchFamily="2" charset="0"/>
-            </a:endParaRPr>
-          </a:p>
-          <a:p>
-            <a:pPr marL="0" indent="0">
-              <a:lnSpc>
-                <a:spcPct val="110000"/>
-              </a:lnSpc>
-              <a:buNone/>
-            </a:pPr>
-            <a:r>
-              <a:rPr lang="en-US" b="1" dirty="0" smtClean="0">
-                <a:latin typeface="Roboto" panose="02000000000000000000" pitchFamily="2" charset="0"/>
-                <a:ea typeface="Roboto" panose="02000000000000000000" pitchFamily="2" charset="0"/>
-                <a:cs typeface="Roboto" panose="02000000000000000000" pitchFamily="2" charset="0"/>
-              </a:rPr>
-              <a:t>      				</a:t>
-            </a:r>
-            <a:r>
-              <a:rPr lang="en-US" dirty="0" err="1" smtClean="0">
-                <a:latin typeface="Roboto Light" panose="02000000000000000000" pitchFamily="2" charset="0"/>
-                <a:ea typeface="Roboto Light" panose="02000000000000000000" pitchFamily="2" charset="0"/>
-                <a:cs typeface="Roboto Light" panose="02000000000000000000" pitchFamily="2" charset="0"/>
-              </a:rPr>
-              <a:t>Checkliste</a:t>
-            </a:r>
-            <a:endParaRPr lang="en-US" dirty="0" smtClean="0">
-              <a:latin typeface="Roboto Light" panose="02000000000000000000" pitchFamily="2" charset="0"/>
-              <a:ea typeface="Roboto Light" panose="02000000000000000000" pitchFamily="2" charset="0"/>
-              <a:cs typeface="Roboto Light" panose="02000000000000000000" pitchFamily="2" charset="0"/>
-            </a:endParaRPr>
-          </a:p>
-          <a:p>
-            <a:pPr marL="0" indent="0">
-              <a:lnSpc>
-                <a:spcPct val="110000"/>
-              </a:lnSpc>
-              <a:buNone/>
-            </a:pPr>
-            <a:endParaRPr lang="en-US" b="1" dirty="0">
-              <a:latin typeface="Roboto" panose="02000000000000000000" pitchFamily="2" charset="0"/>
-              <a:ea typeface="Roboto" panose="02000000000000000000" pitchFamily="2" charset="0"/>
-              <a:cs typeface="Roboto" panose="02000000000000000000" pitchFamily="2" charset="0"/>
-            </a:endParaRPr>
-          </a:p>
-          <a:p>
-            <a:pPr marL="0" indent="0">
-              <a:lnSpc>
-                <a:spcPct val="110000"/>
-              </a:lnSpc>
-              <a:buNone/>
-            </a:pPr>
-            <a:r>
-              <a:rPr lang="en-US" b="1" dirty="0" smtClean="0">
-                <a:latin typeface="Roboto" panose="02000000000000000000" pitchFamily="2" charset="0"/>
-                <a:ea typeface="Roboto" panose="02000000000000000000" pitchFamily="2" charset="0"/>
-                <a:cs typeface="Roboto" panose="02000000000000000000" pitchFamily="2" charset="0"/>
-              </a:rPr>
-              <a:t>                            					    </a:t>
-            </a:r>
-            <a:r>
-              <a:rPr lang="en-US" dirty="0" err="1" smtClean="0">
-                <a:latin typeface="Roboto Light" panose="02000000000000000000" pitchFamily="2" charset="0"/>
-                <a:ea typeface="Roboto Light" panose="02000000000000000000" pitchFamily="2" charset="0"/>
-                <a:cs typeface="Roboto Light" panose="02000000000000000000" pitchFamily="2" charset="0"/>
-              </a:rPr>
-              <a:t>Tagebuch</a:t>
-            </a:r>
-            <a:endParaRPr lang="en-US" dirty="0">
-              <a:latin typeface="Roboto Light" panose="02000000000000000000" pitchFamily="2" charset="0"/>
-              <a:ea typeface="Roboto Light" panose="02000000000000000000" pitchFamily="2" charset="0"/>
-              <a:cs typeface="Roboto Light" panose="02000000000000000000" pitchFamily="2" charset="0"/>
-            </a:endParaRPr>
-          </a:p>
-        </p:txBody>
-      </p:sp>
-      <p:sp>
-        <p:nvSpPr>
-          <p:cNvPr id="3" name="Datumsplatzhalter 2"/>
-          <p:cNvSpPr>
-            <a:spLocks noGrp="1"/>
-          </p:cNvSpPr>
-          <p:nvPr>
-            <p:ph type="dt" sz="half" idx="10"/>
-          </p:nvPr>
-        </p:nvSpPr>
-        <p:spPr/>
-        <p:txBody>
-          <a:bodyPr/>
-          <a:lstStyle/>
-          <a:p>
-            <a:fld id="{22DC5AD6-A57E-4A83-84DC-685C8F7A0281}" type="datetime4">
-              <a:rPr lang="en-US" smtClean="0"/>
-              <a:t>August 6, 2021</a:t>
-            </a:fld>
-            <a:endParaRPr lang="de-DE" dirty="0"/>
-          </a:p>
-        </p:txBody>
-      </p:sp>
-      <p:sp>
-        <p:nvSpPr>
-          <p:cNvPr id="4" name="Fußzeilenplatzhalter 3"/>
-          <p:cNvSpPr>
-            <a:spLocks noGrp="1"/>
-          </p:cNvSpPr>
-          <p:nvPr>
-            <p:ph type="ftr" sz="quarter" idx="11"/>
-          </p:nvPr>
-        </p:nvSpPr>
-        <p:spPr/>
-        <p:txBody>
-          <a:bodyPr/>
-          <a:lstStyle/>
-          <a:p>
-            <a:r>
-              <a:rPr lang="de-DE" smtClean="0"/>
-              <a:t>Reiner Lemoine Institut</a:t>
-            </a:r>
-            <a:endParaRPr lang="de-DE" dirty="0"/>
-          </a:p>
-        </p:txBody>
-      </p:sp>
-      <p:sp>
-        <p:nvSpPr>
-          <p:cNvPr id="5" name="Foliennummernplatzhalter 4"/>
-          <p:cNvSpPr>
-            <a:spLocks noGrp="1"/>
-          </p:cNvSpPr>
-          <p:nvPr>
-            <p:ph type="sldNum" sz="quarter" idx="12"/>
-          </p:nvPr>
-        </p:nvSpPr>
-        <p:spPr/>
-        <p:txBody>
-          <a:bodyPr/>
-          <a:lstStyle/>
-          <a:p>
-            <a:fld id="{C2A96E4E-EC3F-424D-8211-F17AF9FC0446}" type="slidenum">
-              <a:rPr lang="de-DE" smtClean="0"/>
-              <a:pPr/>
-              <a:t>4</a:t>
-            </a:fld>
-            <a:endParaRPr lang="de-DE" dirty="0"/>
-          </a:p>
-        </p:txBody>
-      </p:sp>
-      <p:sp>
-        <p:nvSpPr>
-          <p:cNvPr id="6" name="Titel 5"/>
-          <p:cNvSpPr>
-            <a:spLocks noGrp="1"/>
-          </p:cNvSpPr>
-          <p:nvPr>
-            <p:ph type="title"/>
-          </p:nvPr>
-        </p:nvSpPr>
-        <p:spPr/>
-        <p:txBody>
-          <a:bodyPr/>
-          <a:lstStyle/>
-          <a:p>
-            <a:r>
-              <a:rPr lang="de-DE" dirty="0" smtClean="0"/>
-              <a:t>Einfindung</a:t>
-            </a:r>
-            <a:endParaRPr lang="de-DE" dirty="0"/>
-          </a:p>
-        </p:txBody>
-      </p:sp>
-      <p:cxnSp>
-        <p:nvCxnSpPr>
-          <p:cNvPr id="8" name="Gerade Verbindung mit Pfeil 7"/>
-          <p:cNvCxnSpPr/>
-          <p:nvPr/>
-        </p:nvCxnSpPr>
-        <p:spPr>
-          <a:xfrm>
-            <a:off x="1465011" y="2091745"/>
-            <a:ext cx="1563939" cy="491884"/>
-          </a:xfrm>
-          <a:prstGeom prst="straightConnector1">
-            <a:avLst/>
-          </a:prstGeom>
-          <a:ln w="12700">
-            <a:solidFill>
-              <a:srgbClr val="002E50"/>
-            </a:solidFill>
-            <a:tailEnd type="triangle"/>
-          </a:ln>
-        </p:spPr>
-        <p:style>
-          <a:lnRef idx="1">
-            <a:schemeClr val="accent1"/>
-          </a:lnRef>
-          <a:fillRef idx="0">
-            <a:schemeClr val="accent1"/>
-          </a:fillRef>
-          <a:effectRef idx="0">
-            <a:schemeClr val="accent1"/>
-          </a:effectRef>
-          <a:fontRef idx="minor">
-            <a:schemeClr val="tx1"/>
-          </a:fontRef>
-        </p:style>
-      </p:cxnSp>
-      <p:cxnSp>
-        <p:nvCxnSpPr>
-          <p:cNvPr id="10" name="Gerade Verbindung mit Pfeil 9"/>
-          <p:cNvCxnSpPr/>
-          <p:nvPr/>
-        </p:nvCxnSpPr>
-        <p:spPr>
-          <a:xfrm>
-            <a:off x="4379530" y="3045033"/>
-            <a:ext cx="1563939" cy="491884"/>
-          </a:xfrm>
-          <a:prstGeom prst="straightConnector1">
-            <a:avLst/>
-          </a:prstGeom>
-          <a:ln w="12700">
-            <a:solidFill>
-              <a:srgbClr val="002E50"/>
-            </a:solidFill>
-            <a:tailEnd type="triangle"/>
-          </a:ln>
-        </p:spPr>
-        <p:style>
-          <a:lnRef idx="1">
-            <a:schemeClr val="accent1"/>
-          </a:lnRef>
-          <a:fillRef idx="0">
-            <a:schemeClr val="accent1"/>
-          </a:fillRef>
-          <a:effectRef idx="0">
-            <a:schemeClr val="accent1"/>
-          </a:effectRef>
-          <a:fontRef idx="minor">
-            <a:schemeClr val="tx1"/>
-          </a:fontRef>
-        </p:style>
-      </p:cxnSp>
-      <p:pic>
-        <p:nvPicPr>
-          <p:cNvPr id="11" name="Grafik 10"/>
-          <p:cNvPicPr>
-            <a:picLocks noChangeAspect="1"/>
-          </p:cNvPicPr>
-          <p:nvPr/>
-        </p:nvPicPr>
-        <p:blipFill rotWithShape="1">
-          <a:blip r:embed="rId2"/>
-          <a:srcRect r="43956"/>
-          <a:stretch/>
-        </p:blipFill>
-        <p:spPr>
-          <a:xfrm>
-            <a:off x="304768" y="3218750"/>
-            <a:ext cx="3931474" cy="1476135"/>
-          </a:xfrm>
-          <a:prstGeom prst="rect">
-            <a:avLst/>
-          </a:prstGeom>
-        </p:spPr>
-      </p:pic>
-      <p:pic>
-        <p:nvPicPr>
-          <p:cNvPr id="12" name="Grafik 11"/>
-          <p:cNvPicPr>
-            <a:picLocks noChangeAspect="1"/>
-          </p:cNvPicPr>
-          <p:nvPr/>
-        </p:nvPicPr>
-        <p:blipFill>
-          <a:blip r:embed="rId3"/>
-          <a:stretch>
-            <a:fillRect/>
-          </a:stretch>
-        </p:blipFill>
-        <p:spPr>
-          <a:xfrm>
-            <a:off x="5704691" y="924496"/>
-            <a:ext cx="2134782" cy="2209058"/>
-          </a:xfrm>
-          <a:prstGeom prst="rect">
-            <a:avLst/>
-          </a:prstGeom>
-        </p:spPr>
-      </p:pic>
-    </p:spTree>
-    <p:extLst>
-      <p:ext uri="{BB962C8B-B14F-4D97-AF65-F5344CB8AC3E}">
-        <p14:creationId xmlns:p14="http://schemas.microsoft.com/office/powerpoint/2010/main" val="4000630951"/>
-      </p:ext>
-    </p:extLst>
-  </p:cSld>
-  <p:clrMapOvr>
-    <a:masterClrMapping/>
-  </p:clrMapOvr>
-  <p:timing>
-    <p:tnLst>
-      <p:par>
-        <p:cTn id="1" dur="indefinite" restart="never" nodeType="tmRoot"/>
-      </p:par>
-    </p:tnLst>
-  </p:timing>
-</p:sld>
-</file>
-
-<file path=ppt/slides/slide6.xml><?xml version="1.0" encoding="utf-8"?>
-<p:sld xmlns:a="http://schemas.openxmlformats.org/drawingml/2006/main" xmlns:r="http://schemas.openxmlformats.org/officeDocument/2006/relationships" xmlns:p="http://schemas.openxmlformats.org/presentationml/2006/main">
-  <p:cSld>
-    <p:spTree>
-      <p:nvGrpSpPr>
-        <p:cNvPr id="1" name=""/>
-        <p:cNvGrpSpPr/>
-        <p:nvPr/>
-      </p:nvGrpSpPr>
-      <p:grpSpPr>
-        <a:xfrm>
-          <a:off x="0" y="0"/>
-          <a:ext cx="0" cy="0"/>
-          <a:chOff x="0" y="0"/>
-          <a:chExt cx="0" cy="0"/>
-        </a:xfrm>
-      </p:grpSpPr>
-      <p:sp>
-        <p:nvSpPr>
-          <p:cNvPr id="2" name="Vertikaler Textplatzhalter 1"/>
-          <p:cNvSpPr>
-            <a:spLocks noGrp="1"/>
-          </p:cNvSpPr>
-          <p:nvPr>
-            <p:ph type="body" orient="vert" idx="1"/>
-          </p:nvPr>
-        </p:nvSpPr>
-        <p:spPr/>
-        <p:txBody>
-          <a:bodyPr>
-            <a:normAutofit/>
-          </a:bodyPr>
-          <a:lstStyle/>
-          <a:p>
-            <a:pPr marL="0" indent="0">
-              <a:lnSpc>
-                <a:spcPct val="110000"/>
-              </a:lnSpc>
-              <a:buNone/>
-            </a:pPr>
-            <a:r>
-              <a:rPr lang="en-US" b="1" dirty="0" smtClean="0">
-                <a:latin typeface="Roboto" panose="02000000000000000000" pitchFamily="2" charset="0"/>
-                <a:ea typeface="Roboto" panose="02000000000000000000" pitchFamily="2" charset="0"/>
-                <a:cs typeface="Roboto" panose="02000000000000000000" pitchFamily="2" charset="0"/>
-              </a:rPr>
-              <a:t>           </a:t>
-            </a:r>
-          </a:p>
-        </p:txBody>
-      </p:sp>
-      <p:sp>
-        <p:nvSpPr>
-          <p:cNvPr id="3" name="Datumsplatzhalter 2"/>
-          <p:cNvSpPr>
-            <a:spLocks noGrp="1"/>
-          </p:cNvSpPr>
-          <p:nvPr>
-            <p:ph type="dt" sz="half" idx="10"/>
-          </p:nvPr>
-        </p:nvSpPr>
-        <p:spPr/>
-        <p:txBody>
-          <a:bodyPr/>
-          <a:lstStyle/>
-          <a:p>
-            <a:fld id="{22DC5AD6-A57E-4A83-84DC-685C8F7A0281}" type="datetime4">
-              <a:rPr lang="en-US" smtClean="0"/>
-              <a:t>August 6, 2021</a:t>
-            </a:fld>
-            <a:endParaRPr lang="de-DE" dirty="0"/>
-          </a:p>
-        </p:txBody>
-      </p:sp>
-      <p:sp>
-        <p:nvSpPr>
-          <p:cNvPr id="4" name="Fußzeilenplatzhalter 3"/>
-          <p:cNvSpPr>
-            <a:spLocks noGrp="1"/>
-          </p:cNvSpPr>
-          <p:nvPr>
-            <p:ph type="ftr" sz="quarter" idx="11"/>
-          </p:nvPr>
-        </p:nvSpPr>
-        <p:spPr/>
-        <p:txBody>
-          <a:bodyPr/>
-          <a:lstStyle/>
-          <a:p>
-            <a:r>
-              <a:rPr lang="de-DE" smtClean="0"/>
-              <a:t>Reiner Lemoine Institut</a:t>
-            </a:r>
-            <a:endParaRPr lang="de-DE" dirty="0"/>
-          </a:p>
-        </p:txBody>
-      </p:sp>
-      <p:sp>
-        <p:nvSpPr>
-          <p:cNvPr id="5" name="Foliennummernplatzhalter 4"/>
-          <p:cNvSpPr>
-            <a:spLocks noGrp="1"/>
-          </p:cNvSpPr>
-          <p:nvPr>
-            <p:ph type="sldNum" sz="quarter" idx="12"/>
-          </p:nvPr>
-        </p:nvSpPr>
-        <p:spPr/>
-        <p:txBody>
-          <a:bodyPr/>
-          <a:lstStyle/>
-          <a:p>
-            <a:fld id="{C2A96E4E-EC3F-424D-8211-F17AF9FC0446}" type="slidenum">
-              <a:rPr lang="de-DE" smtClean="0"/>
-              <a:pPr/>
-              <a:t>5</a:t>
-            </a:fld>
-            <a:endParaRPr lang="de-DE" dirty="0"/>
-          </a:p>
-        </p:txBody>
-      </p:sp>
-      <p:sp>
-        <p:nvSpPr>
-          <p:cNvPr id="6" name="Titel 5"/>
-          <p:cNvSpPr>
-            <a:spLocks noGrp="1"/>
-          </p:cNvSpPr>
-          <p:nvPr>
-            <p:ph type="title"/>
-          </p:nvPr>
-        </p:nvSpPr>
-        <p:spPr/>
-        <p:txBody>
-          <a:bodyPr/>
-          <a:lstStyle/>
-          <a:p>
-            <a:r>
-              <a:rPr lang="de-DE" dirty="0" smtClean="0"/>
-              <a:t>Aufgaben</a:t>
-            </a:r>
-            <a:endParaRPr lang="de-DE" dirty="0"/>
-          </a:p>
-        </p:txBody>
-      </p:sp>
-      <p:graphicFrame>
-        <p:nvGraphicFramePr>
-          <p:cNvPr id="7" name="Diagramm 6"/>
-          <p:cNvGraphicFramePr/>
-          <p:nvPr>
-            <p:extLst>
-              <p:ext uri="{D42A27DB-BD31-4B8C-83A1-F6EECF244321}">
-                <p14:modId xmlns:p14="http://schemas.microsoft.com/office/powerpoint/2010/main" val="3611725255"/>
-              </p:ext>
-            </p:extLst>
-          </p:nvPr>
-        </p:nvGraphicFramePr>
-        <p:xfrm>
-          <a:off x="636398" y="699970"/>
-          <a:ext cx="4038074" cy="3008280"/>
-        </p:xfrm>
-        <a:graphic>
-          <a:graphicData uri="http://schemas.openxmlformats.org/drawingml/2006/diagram">
-            <dgm:relIds xmlns:dgm="http://schemas.openxmlformats.org/drawingml/2006/diagram" xmlns:r="http://schemas.openxmlformats.org/officeDocument/2006/relationships" r:dm="rId2" r:lo="rId3" r:qs="rId4" r:cs="rId5"/>
-          </a:graphicData>
-        </a:graphic>
-      </p:graphicFrame>
-      <p:graphicFrame>
-        <p:nvGraphicFramePr>
-          <p:cNvPr id="13" name="Diagramm 12"/>
-          <p:cNvGraphicFramePr/>
-          <p:nvPr>
-            <p:extLst>
-              <p:ext uri="{D42A27DB-BD31-4B8C-83A1-F6EECF244321}">
-                <p14:modId xmlns:p14="http://schemas.microsoft.com/office/powerpoint/2010/main" val="1481613124"/>
-              </p:ext>
-            </p:extLst>
-          </p:nvPr>
-        </p:nvGraphicFramePr>
-        <p:xfrm>
-          <a:off x="4032050" y="1086235"/>
-          <a:ext cx="4364436" cy="3506391"/>
-        </p:xfrm>
-        <a:graphic>
-          <a:graphicData uri="http://schemas.openxmlformats.org/drawingml/2006/diagram">
-            <dgm:relIds xmlns:dgm="http://schemas.openxmlformats.org/drawingml/2006/diagram" xmlns:r="http://schemas.openxmlformats.org/officeDocument/2006/relationships" r:dm="rId7" r:lo="rId8" r:qs="rId9" r:cs="rId10"/>
-          </a:graphicData>
-        </a:graphic>
-      </p:graphicFrame>
-    </p:spTree>
-    <p:extLst>
-      <p:ext uri="{BB962C8B-B14F-4D97-AF65-F5344CB8AC3E}">
-        <p14:creationId xmlns:p14="http://schemas.microsoft.com/office/powerpoint/2010/main" val="53456987"/>
-      </p:ext>
-    </p:extLst>
-  </p:cSld>
-  <p:clrMapOvr>
-    <a:masterClrMapping/>
-  </p:clrMapOvr>
-  <p:timing>
-    <p:tnLst>
-      <p:par>
-        <p:cTn id="1" dur="indefinite" restart="never" nodeType="tmRoot"/>
-      </p:par>
-    </p:tnLst>
-  </p:timing>
-</p:sld>
-</file>
-
-<file path=ppt/slides/slide7.xml><?xml version="1.0" encoding="utf-8"?>
-<p:sld xmlns:a="http://schemas.openxmlformats.org/drawingml/2006/main" xmlns:r="http://schemas.openxmlformats.org/officeDocument/2006/relationships" xmlns:p="http://schemas.openxmlformats.org/presentationml/2006/main">
-  <p:cSld>
-    <p:spTree>
-      <p:nvGrpSpPr>
-        <p:cNvPr id="1" name=""/>
-        <p:cNvGrpSpPr/>
-        <p:nvPr/>
-      </p:nvGrpSpPr>
-      <p:grpSpPr>
-        <a:xfrm>
-          <a:off x="0" y="0"/>
-          <a:ext cx="0" cy="0"/>
-          <a:chOff x="0" y="0"/>
-          <a:chExt cx="0" cy="0"/>
-        </a:xfrm>
-      </p:grpSpPr>
-      <p:sp>
-        <p:nvSpPr>
-          <p:cNvPr id="2" name="Vertikaler Textplatzhalter 1"/>
-          <p:cNvSpPr>
-            <a:spLocks noGrp="1"/>
-          </p:cNvSpPr>
-          <p:nvPr>
-            <p:ph type="body" orient="vert" idx="1"/>
-          </p:nvPr>
-        </p:nvSpPr>
-        <p:spPr/>
-        <p:txBody>
-          <a:bodyPr>
-            <a:normAutofit/>
-          </a:bodyPr>
-          <a:lstStyle/>
-          <a:p>
-            <a:pPr marL="0" indent="0">
-              <a:lnSpc>
-                <a:spcPct val="110000"/>
-              </a:lnSpc>
-              <a:buNone/>
-            </a:pPr>
-            <a:r>
-              <a:rPr lang="en-US" b="1" dirty="0" smtClean="0">
-                <a:latin typeface="Roboto" panose="02000000000000000000" pitchFamily="2" charset="0"/>
-                <a:ea typeface="Roboto" panose="02000000000000000000" pitchFamily="2" charset="0"/>
-                <a:cs typeface="Roboto" panose="02000000000000000000" pitchFamily="2" charset="0"/>
-              </a:rPr>
-              <a:t>           </a:t>
-            </a:r>
-          </a:p>
-          <a:p>
-            <a:pPr marL="0" indent="0">
-              <a:lnSpc>
-                <a:spcPct val="110000"/>
-              </a:lnSpc>
-              <a:buNone/>
-            </a:pPr>
-            <a:r>
-              <a:rPr lang="en-US" dirty="0" smtClean="0">
-                <a:latin typeface="+mn-lt"/>
-                <a:ea typeface="Roboto" panose="02000000000000000000" pitchFamily="2" charset="0"/>
-                <a:cs typeface="Roboto" panose="02000000000000000000" pitchFamily="2" charset="0"/>
-              </a:rPr>
-              <a:t>	asana		</a:t>
-            </a:r>
-            <a:r>
-              <a:rPr lang="en-US" dirty="0" smtClean="0">
-                <a:latin typeface="+mn-lt"/>
-                <a:ea typeface="Roboto" panose="02000000000000000000" pitchFamily="2" charset="0"/>
-                <a:cs typeface="Roboto" panose="02000000000000000000" pitchFamily="2" charset="0"/>
-                <a:sym typeface="Wingdings" panose="05000000000000000000" pitchFamily="2" charset="2"/>
-              </a:rPr>
-              <a:t> </a:t>
-            </a:r>
-            <a:r>
-              <a:rPr lang="en-US" dirty="0" err="1" smtClean="0">
-                <a:latin typeface="+mn-lt"/>
-                <a:ea typeface="Roboto" panose="02000000000000000000" pitchFamily="2" charset="0"/>
-                <a:cs typeface="Roboto" panose="02000000000000000000" pitchFamily="2" charset="0"/>
-                <a:sym typeface="Wingdings" panose="05000000000000000000" pitchFamily="2" charset="2"/>
-              </a:rPr>
-              <a:t>Organisation</a:t>
-            </a:r>
-            <a:r>
-              <a:rPr lang="en-US" dirty="0" smtClean="0">
-                <a:latin typeface="+mn-lt"/>
-                <a:ea typeface="Roboto" panose="02000000000000000000" pitchFamily="2" charset="0"/>
-                <a:cs typeface="Roboto" panose="02000000000000000000" pitchFamily="2" charset="0"/>
-                <a:sym typeface="Wingdings" panose="05000000000000000000" pitchFamily="2" charset="2"/>
-              </a:rPr>
-              <a:t> der </a:t>
-            </a:r>
-            <a:r>
-              <a:rPr lang="en-US" dirty="0" err="1" smtClean="0">
-                <a:latin typeface="+mn-lt"/>
-                <a:ea typeface="Roboto" panose="02000000000000000000" pitchFamily="2" charset="0"/>
-                <a:cs typeface="Roboto" panose="02000000000000000000" pitchFamily="2" charset="0"/>
-                <a:sym typeface="Wingdings" panose="05000000000000000000" pitchFamily="2" charset="2"/>
-              </a:rPr>
-              <a:t>Aufgaben</a:t>
-            </a:r>
-            <a:endParaRPr lang="en-US" dirty="0" smtClean="0">
-              <a:latin typeface="+mn-lt"/>
-              <a:ea typeface="Roboto" panose="02000000000000000000" pitchFamily="2" charset="0"/>
-              <a:cs typeface="Roboto" panose="02000000000000000000" pitchFamily="2" charset="0"/>
-              <a:sym typeface="Wingdings" panose="05000000000000000000" pitchFamily="2" charset="2"/>
-            </a:endParaRPr>
-          </a:p>
-          <a:p>
-            <a:pPr marL="0" indent="0">
-              <a:lnSpc>
-                <a:spcPct val="110000"/>
-              </a:lnSpc>
-              <a:buNone/>
-            </a:pPr>
-            <a:r>
-              <a:rPr lang="en-US" dirty="0">
-                <a:latin typeface="+mn-lt"/>
-                <a:ea typeface="Roboto" panose="02000000000000000000" pitchFamily="2" charset="0"/>
-                <a:cs typeface="Roboto" panose="02000000000000000000" pitchFamily="2" charset="0"/>
-                <a:sym typeface="Wingdings" panose="05000000000000000000" pitchFamily="2" charset="2"/>
-              </a:rPr>
-              <a:t>	</a:t>
-            </a:r>
-            <a:r>
-              <a:rPr lang="en-US" dirty="0" err="1" smtClean="0">
-                <a:latin typeface="+mn-lt"/>
-                <a:ea typeface="Roboto" panose="02000000000000000000" pitchFamily="2" charset="0"/>
-                <a:cs typeface="Roboto" panose="02000000000000000000" pitchFamily="2" charset="0"/>
-                <a:sym typeface="Wingdings" panose="05000000000000000000" pitchFamily="2" charset="2"/>
-              </a:rPr>
-              <a:t>DeepL</a:t>
-            </a:r>
-            <a:r>
-              <a:rPr lang="en-US" dirty="0" smtClean="0">
-                <a:latin typeface="+mn-lt"/>
-                <a:ea typeface="Roboto" panose="02000000000000000000" pitchFamily="2" charset="0"/>
-                <a:cs typeface="Roboto" panose="02000000000000000000" pitchFamily="2" charset="0"/>
-                <a:sym typeface="Wingdings" panose="05000000000000000000" pitchFamily="2" charset="2"/>
-              </a:rPr>
-              <a:t>		 </a:t>
-            </a:r>
-            <a:r>
-              <a:rPr lang="en-US" dirty="0" err="1" smtClean="0">
-                <a:latin typeface="+mn-lt"/>
-                <a:ea typeface="Roboto" panose="02000000000000000000" pitchFamily="2" charset="0"/>
-                <a:cs typeface="Roboto" panose="02000000000000000000" pitchFamily="2" charset="0"/>
-                <a:sym typeface="Wingdings" panose="05000000000000000000" pitchFamily="2" charset="2"/>
-              </a:rPr>
-              <a:t>Übersetzer</a:t>
-            </a:r>
-            <a:endParaRPr lang="en-US" dirty="0" smtClean="0">
-              <a:latin typeface="+mn-lt"/>
-              <a:ea typeface="Roboto" panose="02000000000000000000" pitchFamily="2" charset="0"/>
-              <a:cs typeface="Roboto" panose="02000000000000000000" pitchFamily="2" charset="0"/>
-              <a:sym typeface="Wingdings" panose="05000000000000000000" pitchFamily="2" charset="2"/>
-            </a:endParaRPr>
-          </a:p>
-          <a:p>
-            <a:pPr marL="0" indent="0">
-              <a:lnSpc>
-                <a:spcPct val="110000"/>
-              </a:lnSpc>
-              <a:buNone/>
-            </a:pPr>
-            <a:r>
-              <a:rPr lang="en-US" dirty="0">
-                <a:latin typeface="+mn-lt"/>
-                <a:ea typeface="Roboto" panose="02000000000000000000" pitchFamily="2" charset="0"/>
-                <a:cs typeface="Roboto" panose="02000000000000000000" pitchFamily="2" charset="0"/>
-                <a:sym typeface="Wingdings" panose="05000000000000000000" pitchFamily="2" charset="2"/>
-              </a:rPr>
-              <a:t>	</a:t>
-            </a:r>
-            <a:r>
-              <a:rPr lang="en-US" dirty="0" err="1" smtClean="0">
-                <a:latin typeface="+mn-lt"/>
-                <a:ea typeface="Roboto" panose="02000000000000000000" pitchFamily="2" charset="0"/>
-                <a:cs typeface="Roboto" panose="02000000000000000000" pitchFamily="2" charset="0"/>
-                <a:sym typeface="Wingdings" panose="05000000000000000000" pitchFamily="2" charset="2"/>
-              </a:rPr>
-              <a:t>Mentimeter</a:t>
-            </a:r>
-            <a:r>
-              <a:rPr lang="en-US" dirty="0" smtClean="0">
-                <a:latin typeface="+mn-lt"/>
-                <a:ea typeface="Roboto" panose="02000000000000000000" pitchFamily="2" charset="0"/>
-                <a:cs typeface="Roboto" panose="02000000000000000000" pitchFamily="2" charset="0"/>
-                <a:sym typeface="Wingdings" panose="05000000000000000000" pitchFamily="2" charset="2"/>
-              </a:rPr>
-              <a:t>	 </a:t>
-            </a:r>
-            <a:r>
-              <a:rPr lang="en-US" dirty="0" err="1" smtClean="0">
-                <a:latin typeface="+mn-lt"/>
-                <a:ea typeface="Roboto" panose="02000000000000000000" pitchFamily="2" charset="0"/>
-                <a:cs typeface="Roboto" panose="02000000000000000000" pitchFamily="2" charset="0"/>
-                <a:sym typeface="Wingdings" panose="05000000000000000000" pitchFamily="2" charset="2"/>
-              </a:rPr>
-              <a:t>Umfragen</a:t>
-            </a:r>
-            <a:r>
-              <a:rPr lang="en-US" dirty="0" smtClean="0">
-                <a:latin typeface="+mn-lt"/>
-                <a:ea typeface="Roboto" panose="02000000000000000000" pitchFamily="2" charset="0"/>
-                <a:cs typeface="Roboto" panose="02000000000000000000" pitchFamily="2" charset="0"/>
-                <a:sym typeface="Wingdings" panose="05000000000000000000" pitchFamily="2" charset="2"/>
-              </a:rPr>
-              <a:t>/ </a:t>
-            </a:r>
-            <a:r>
-              <a:rPr lang="en-US" dirty="0" err="1" smtClean="0">
-                <a:latin typeface="+mn-lt"/>
-                <a:ea typeface="Roboto" panose="02000000000000000000" pitchFamily="2" charset="0"/>
-                <a:cs typeface="Roboto" panose="02000000000000000000" pitchFamily="2" charset="0"/>
-                <a:sym typeface="Wingdings" panose="05000000000000000000" pitchFamily="2" charset="2"/>
-              </a:rPr>
-              <a:t>Meinungsbild</a:t>
-            </a:r>
-            <a:endParaRPr lang="en-US" dirty="0" smtClean="0">
-              <a:latin typeface="+mn-lt"/>
-              <a:ea typeface="Roboto" panose="02000000000000000000" pitchFamily="2" charset="0"/>
-              <a:cs typeface="Roboto" panose="02000000000000000000" pitchFamily="2" charset="0"/>
-              <a:sym typeface="Wingdings" panose="05000000000000000000" pitchFamily="2" charset="2"/>
-            </a:endParaRPr>
-          </a:p>
-          <a:p>
-            <a:pPr marL="0" indent="0">
-              <a:lnSpc>
-                <a:spcPct val="110000"/>
-              </a:lnSpc>
-              <a:buNone/>
-            </a:pPr>
-            <a:r>
-              <a:rPr lang="en-US" dirty="0">
-                <a:latin typeface="+mn-lt"/>
-                <a:ea typeface="Roboto" panose="02000000000000000000" pitchFamily="2" charset="0"/>
-                <a:cs typeface="Roboto" panose="02000000000000000000" pitchFamily="2" charset="0"/>
-                <a:sym typeface="Wingdings" panose="05000000000000000000" pitchFamily="2" charset="2"/>
-              </a:rPr>
-              <a:t>	</a:t>
-            </a:r>
-            <a:r>
-              <a:rPr lang="en-US" dirty="0" smtClean="0">
-                <a:latin typeface="+mn-lt"/>
-                <a:ea typeface="Roboto" panose="02000000000000000000" pitchFamily="2" charset="0"/>
-                <a:cs typeface="Roboto" panose="02000000000000000000" pitchFamily="2" charset="0"/>
-                <a:sym typeface="Wingdings" panose="05000000000000000000" pitchFamily="2" charset="2"/>
-              </a:rPr>
-              <a:t>Miro Board	 Mind Map</a:t>
-            </a:r>
-            <a:endParaRPr lang="en-US" dirty="0" smtClean="0">
-              <a:latin typeface="+mn-lt"/>
-              <a:ea typeface="Roboto" panose="02000000000000000000" pitchFamily="2" charset="0"/>
-              <a:cs typeface="Roboto" panose="02000000000000000000" pitchFamily="2" charset="0"/>
-            </a:endParaRPr>
-          </a:p>
-        </p:txBody>
-      </p:sp>
-      <p:sp>
-        <p:nvSpPr>
-          <p:cNvPr id="3" name="Datumsplatzhalter 2"/>
-          <p:cNvSpPr>
-            <a:spLocks noGrp="1"/>
-          </p:cNvSpPr>
-          <p:nvPr>
-            <p:ph type="dt" sz="half" idx="10"/>
-          </p:nvPr>
-        </p:nvSpPr>
-        <p:spPr/>
-        <p:txBody>
-          <a:bodyPr/>
-          <a:lstStyle/>
-          <a:p>
-            <a:fld id="{22DC5AD6-A57E-4A83-84DC-685C8F7A0281}" type="datetime4">
-              <a:rPr lang="en-US" smtClean="0"/>
-              <a:t>August 6, 2021</a:t>
-            </a:fld>
-            <a:endParaRPr lang="de-DE" dirty="0"/>
-          </a:p>
-        </p:txBody>
-      </p:sp>
-      <p:sp>
-        <p:nvSpPr>
-          <p:cNvPr id="4" name="Fußzeilenplatzhalter 3"/>
-          <p:cNvSpPr>
-            <a:spLocks noGrp="1"/>
-          </p:cNvSpPr>
-          <p:nvPr>
-            <p:ph type="ftr" sz="quarter" idx="11"/>
-          </p:nvPr>
-        </p:nvSpPr>
-        <p:spPr/>
-        <p:txBody>
-          <a:bodyPr/>
-          <a:lstStyle/>
-          <a:p>
-            <a:r>
-              <a:rPr lang="de-DE" smtClean="0"/>
-              <a:t>Reiner Lemoine Institut</a:t>
-            </a:r>
-            <a:endParaRPr lang="de-DE" dirty="0"/>
-          </a:p>
-        </p:txBody>
-      </p:sp>
-      <p:sp>
-        <p:nvSpPr>
-          <p:cNvPr id="5" name="Foliennummernplatzhalter 4"/>
-          <p:cNvSpPr>
-            <a:spLocks noGrp="1"/>
-          </p:cNvSpPr>
-          <p:nvPr>
-            <p:ph type="sldNum" sz="quarter" idx="12"/>
-          </p:nvPr>
-        </p:nvSpPr>
-        <p:spPr/>
-        <p:txBody>
-          <a:bodyPr/>
-          <a:lstStyle/>
-          <a:p>
-            <a:fld id="{C2A96E4E-EC3F-424D-8211-F17AF9FC0446}" type="slidenum">
-              <a:rPr lang="de-DE" smtClean="0"/>
-              <a:pPr/>
-              <a:t>6</a:t>
-            </a:fld>
-            <a:endParaRPr lang="de-DE" dirty="0"/>
-          </a:p>
-        </p:txBody>
-      </p:sp>
-      <p:sp>
-        <p:nvSpPr>
-          <p:cNvPr id="6" name="Titel 5"/>
-          <p:cNvSpPr>
-            <a:spLocks noGrp="1"/>
-          </p:cNvSpPr>
-          <p:nvPr>
-            <p:ph type="title"/>
-          </p:nvPr>
-        </p:nvSpPr>
-        <p:spPr/>
-        <p:txBody>
-          <a:bodyPr/>
-          <a:lstStyle/>
-          <a:p>
-            <a:r>
-              <a:rPr lang="de-DE" dirty="0" smtClean="0"/>
-              <a:t>Tools</a:t>
-            </a:r>
-            <a:endParaRPr lang="de-DE" dirty="0"/>
-          </a:p>
-        </p:txBody>
-      </p:sp>
-      <p:pic>
-        <p:nvPicPr>
-          <p:cNvPr id="9" name="Grafik 8"/>
-          <p:cNvPicPr>
-            <a:picLocks noChangeAspect="1"/>
-          </p:cNvPicPr>
-          <p:nvPr/>
-        </p:nvPicPr>
-        <p:blipFill>
-          <a:blip r:embed="rId2">
-            <a:extLst>
-              <a:ext uri="{28A0092B-C50C-407E-A947-70E740481C1C}">
-                <a14:useLocalDpi xmlns:a14="http://schemas.microsoft.com/office/drawing/2010/main" val="0"/>
-              </a:ext>
-            </a:extLst>
-          </a:blip>
-          <a:stretch>
-            <a:fillRect/>
-          </a:stretch>
-        </p:blipFill>
-        <p:spPr>
-          <a:xfrm>
-            <a:off x="836188" y="1515814"/>
-            <a:ext cx="365093" cy="365093"/>
-          </a:xfrm>
-          <a:prstGeom prst="rect">
-            <a:avLst/>
-          </a:prstGeom>
-        </p:spPr>
-      </p:pic>
-      <p:pic>
-        <p:nvPicPr>
-          <p:cNvPr id="11" name="Grafik 10"/>
-          <p:cNvPicPr>
-            <a:picLocks noChangeAspect="1"/>
-          </p:cNvPicPr>
-          <p:nvPr/>
-        </p:nvPicPr>
-        <p:blipFill>
-          <a:blip r:embed="rId3">
-            <a:extLst>
-              <a:ext uri="{28A0092B-C50C-407E-A947-70E740481C1C}">
-                <a14:useLocalDpi xmlns:a14="http://schemas.microsoft.com/office/drawing/2010/main" val="0"/>
-              </a:ext>
-            </a:extLst>
-          </a:blip>
-          <a:stretch>
-            <a:fillRect/>
-          </a:stretch>
-        </p:blipFill>
-        <p:spPr>
-          <a:xfrm>
-            <a:off x="816975" y="1988373"/>
-            <a:ext cx="403521" cy="403521"/>
-          </a:xfrm>
-          <a:prstGeom prst="rect">
-            <a:avLst/>
-          </a:prstGeom>
-        </p:spPr>
-      </p:pic>
-      <p:pic>
-        <p:nvPicPr>
-          <p:cNvPr id="7" name="Grafik 6"/>
-          <p:cNvPicPr>
-            <a:picLocks noChangeAspect="1"/>
-          </p:cNvPicPr>
-          <p:nvPr/>
-        </p:nvPicPr>
-        <p:blipFill rotWithShape="1">
-          <a:blip r:embed="rId4">
-            <a:extLst>
-              <a:ext uri="{28A0092B-C50C-407E-A947-70E740481C1C}">
-                <a14:useLocalDpi xmlns:a14="http://schemas.microsoft.com/office/drawing/2010/main" val="0"/>
-              </a:ext>
-            </a:extLst>
-          </a:blip>
-          <a:srcRect l="35583" r="33417" b="30048"/>
-          <a:stretch/>
-        </p:blipFill>
-        <p:spPr>
-          <a:xfrm>
-            <a:off x="823627" y="2499360"/>
-            <a:ext cx="447648" cy="373380"/>
-          </a:xfrm>
-          <a:prstGeom prst="rect">
-            <a:avLst/>
-          </a:prstGeom>
-        </p:spPr>
-      </p:pic>
-      <p:pic>
-        <p:nvPicPr>
-          <p:cNvPr id="8" name="Grafik 7"/>
-          <p:cNvPicPr>
-            <a:picLocks noChangeAspect="1"/>
-          </p:cNvPicPr>
-          <p:nvPr/>
-        </p:nvPicPr>
-        <p:blipFill>
-          <a:blip r:embed="rId5">
-            <a:extLst>
-              <a:ext uri="{28A0092B-C50C-407E-A947-70E740481C1C}">
-                <a14:useLocalDpi xmlns:a14="http://schemas.microsoft.com/office/drawing/2010/main" val="0"/>
-              </a:ext>
-            </a:extLst>
-          </a:blip>
-          <a:stretch>
-            <a:fillRect/>
-          </a:stretch>
-        </p:blipFill>
-        <p:spPr>
-          <a:xfrm>
-            <a:off x="861634" y="2980206"/>
-            <a:ext cx="339647" cy="339647"/>
-          </a:xfrm>
-          <a:prstGeom prst="rect">
-            <a:avLst/>
-          </a:prstGeom>
-        </p:spPr>
-      </p:pic>
-    </p:spTree>
-    <p:extLst>
-      <p:ext uri="{BB962C8B-B14F-4D97-AF65-F5344CB8AC3E}">
-        <p14:creationId xmlns:p14="http://schemas.microsoft.com/office/powerpoint/2010/main" val="1041178221"/>
-      </p:ext>
-    </p:extLst>
-  </p:cSld>
-  <p:clrMapOvr>
-    <a:masterClrMapping/>
-  </p:clrMapOvr>
-  <p:timing>
-    <p:tnLst>
-      <p:par>
-        <p:cTn id="1" dur="indefinite" restart="never" nodeType="tmRoot"/>
-      </p:par>
-    </p:tnLst>
-  </p:timing>
-</p:sld>
-</file>
-
-<file path=ppt/slides/slide8.xml><?xml version="1.0" encoding="utf-8"?>
-<p:sld xmlns:a="http://schemas.openxmlformats.org/drawingml/2006/main" xmlns:r="http://schemas.openxmlformats.org/officeDocument/2006/relationships" xmlns:p="http://schemas.openxmlformats.org/presentationml/2006/main">
-  <p:cSld>
-    <p:spTree>
-      <p:nvGrpSpPr>
-        <p:cNvPr id="1" name=""/>
-        <p:cNvGrpSpPr/>
-        <p:nvPr/>
-      </p:nvGrpSpPr>
-      <p:grpSpPr>
-        <a:xfrm>
-          <a:off x="0" y="0"/>
-          <a:ext cx="0" cy="0"/>
-          <a:chOff x="0" y="0"/>
-          <a:chExt cx="0" cy="0"/>
-        </a:xfrm>
-      </p:grpSpPr>
-      <p:sp>
-        <p:nvSpPr>
-          <p:cNvPr id="3" name="Datumsplatzhalter 2"/>
-          <p:cNvSpPr>
-            <a:spLocks noGrp="1"/>
-          </p:cNvSpPr>
-          <p:nvPr>
-            <p:ph type="dt" sz="half" idx="10"/>
-          </p:nvPr>
-        </p:nvSpPr>
-        <p:spPr/>
-        <p:txBody>
-          <a:bodyPr/>
-          <a:lstStyle/>
-          <a:p>
-            <a:fld id="{361AB9F4-E407-4647-87A8-CA083E5FB64E}" type="datetime4">
-              <a:rPr lang="en-US" smtClean="0"/>
-              <a:t>August 6, 2021</a:t>
-            </a:fld>
-            <a:endParaRPr lang="de-DE" dirty="0"/>
-          </a:p>
-        </p:txBody>
-      </p:sp>
-      <p:sp>
-        <p:nvSpPr>
-          <p:cNvPr id="4" name="Fußzeilenplatzhalter 3"/>
-          <p:cNvSpPr>
-            <a:spLocks noGrp="1"/>
-          </p:cNvSpPr>
-          <p:nvPr>
-            <p:ph type="ftr" sz="quarter" idx="11"/>
-          </p:nvPr>
-        </p:nvSpPr>
-        <p:spPr/>
-        <p:txBody>
-          <a:bodyPr/>
-          <a:lstStyle/>
-          <a:p>
-            <a:r>
-              <a:rPr lang="de-DE" smtClean="0"/>
-              <a:t>Reiner Lemoine Institut</a:t>
-            </a:r>
-            <a:endParaRPr lang="de-DE" dirty="0"/>
-          </a:p>
-        </p:txBody>
-      </p:sp>
-      <p:sp>
-        <p:nvSpPr>
-          <p:cNvPr id="5" name="Foliennummernplatzhalter 4"/>
-          <p:cNvSpPr>
-            <a:spLocks noGrp="1"/>
-          </p:cNvSpPr>
-          <p:nvPr>
-            <p:ph type="sldNum" sz="quarter" idx="12"/>
-          </p:nvPr>
-        </p:nvSpPr>
-        <p:spPr/>
-        <p:txBody>
-          <a:bodyPr/>
-          <a:lstStyle/>
-          <a:p>
-            <a:fld id="{C2A96E4E-EC3F-424D-8211-F17AF9FC0446}" type="slidenum">
-              <a:rPr lang="de-DE" smtClean="0"/>
-              <a:pPr/>
-              <a:t>7</a:t>
-            </a:fld>
-            <a:endParaRPr lang="de-DE" dirty="0"/>
-          </a:p>
-        </p:txBody>
-      </p:sp>
-      <p:pic>
-        <p:nvPicPr>
-          <p:cNvPr id="2" name="Grafik 1"/>
-          <p:cNvPicPr>
-            <a:picLocks noChangeAspect="1"/>
-          </p:cNvPicPr>
-          <p:nvPr/>
-        </p:nvPicPr>
-        <p:blipFill>
-          <a:blip r:embed="rId2"/>
-          <a:stretch>
-            <a:fillRect/>
-          </a:stretch>
-        </p:blipFill>
-        <p:spPr>
-          <a:xfrm>
-            <a:off x="334297" y="0"/>
-            <a:ext cx="8675515" cy="4868911"/>
-          </a:xfrm>
-          <a:prstGeom prst="rect">
-            <a:avLst/>
-          </a:prstGeom>
-        </p:spPr>
-      </p:pic>
-    </p:spTree>
-    <p:extLst>
-      <p:ext uri="{BB962C8B-B14F-4D97-AF65-F5344CB8AC3E}">
-        <p14:creationId xmlns:p14="http://schemas.microsoft.com/office/powerpoint/2010/main" val="476963574"/>
-      </p:ext>
-    </p:extLst>
-  </p:cSld>
-  <p:clrMapOvr>
-    <a:masterClrMapping/>
-  </p:clrMapOvr>
-  <p:timing>
-    <p:tnLst>
-      <p:par>
-        <p:cTn id="1" dur="indefinite" restart="never" nodeType="tmRoot"/>
-      </p:par>
-    </p:tnLst>
-  </p:timing>
-</p:sld>
-</file>
-
-<file path=ppt/slides/slide9.xml><?xml version="1.0" encoding="utf-8"?>
-<p:sld xmlns:a="http://schemas.openxmlformats.org/drawingml/2006/main" xmlns:r="http://schemas.openxmlformats.org/officeDocument/2006/relationships" xmlns:p="http://schemas.openxmlformats.org/presentationml/2006/main">
-  <p:cSld>
-    <p:spTree>
-      <p:nvGrpSpPr>
-        <p:cNvPr id="1" name=""/>
-        <p:cNvGrpSpPr/>
-        <p:nvPr/>
-      </p:nvGrpSpPr>
-      <p:grpSpPr>
-        <a:xfrm>
-          <a:off x="0" y="0"/>
-          <a:ext cx="0" cy="0"/>
-          <a:chOff x="0" y="0"/>
-          <a:chExt cx="0" cy="0"/>
-        </a:xfrm>
-      </p:grpSpPr>
-      <p:sp>
-        <p:nvSpPr>
-          <p:cNvPr id="2" name="Vertikaler Textplatzhalter 1"/>
-          <p:cNvSpPr>
-            <a:spLocks noGrp="1"/>
-          </p:cNvSpPr>
-          <p:nvPr>
-            <p:ph type="body" orient="vert" idx="1"/>
-          </p:nvPr>
-        </p:nvSpPr>
-        <p:spPr/>
-        <p:txBody>
-          <a:bodyPr>
-            <a:normAutofit/>
-          </a:bodyPr>
-          <a:lstStyle/>
-          <a:p>
-            <a:pPr>
-              <a:lnSpc>
-                <a:spcPct val="110000"/>
-              </a:lnSpc>
-            </a:pPr>
-            <a:r>
-              <a:rPr lang="en-US" dirty="0" smtClean="0">
-                <a:latin typeface="Roboto Light" panose="02000000000000000000" pitchFamily="2" charset="0"/>
-                <a:ea typeface="Roboto Light" panose="02000000000000000000" pitchFamily="2" charset="0"/>
-                <a:cs typeface="Roboto Light" panose="02000000000000000000" pitchFamily="2" charset="0"/>
-              </a:rPr>
-              <a:t>Command Line</a:t>
-            </a:r>
-          </a:p>
-          <a:p>
-            <a:pPr>
-              <a:lnSpc>
-                <a:spcPct val="110000"/>
-              </a:lnSpc>
-            </a:pPr>
-            <a:r>
-              <a:rPr lang="en-US" dirty="0" smtClean="0">
-                <a:latin typeface="Roboto Light" panose="02000000000000000000" pitchFamily="2" charset="0"/>
-                <a:ea typeface="Roboto Light" panose="02000000000000000000" pitchFamily="2" charset="0"/>
-                <a:cs typeface="Roboto Light" panose="02000000000000000000" pitchFamily="2" charset="0"/>
-              </a:rPr>
-              <a:t>Virtual </a:t>
-            </a:r>
-            <a:r>
-              <a:rPr lang="en-US" dirty="0" err="1" smtClean="0">
-                <a:latin typeface="Roboto Light" panose="02000000000000000000" pitchFamily="2" charset="0"/>
-                <a:ea typeface="Roboto Light" panose="02000000000000000000" pitchFamily="2" charset="0"/>
-                <a:cs typeface="Roboto Light" panose="02000000000000000000" pitchFamily="2" charset="0"/>
-              </a:rPr>
-              <a:t>Enviroment</a:t>
-            </a:r>
-            <a:r>
-              <a:rPr lang="en-US" b="1" dirty="0" smtClean="0">
-                <a:latin typeface="Roboto" panose="02000000000000000000" pitchFamily="2" charset="0"/>
-                <a:ea typeface="Roboto" panose="02000000000000000000" pitchFamily="2" charset="0"/>
-                <a:cs typeface="Roboto" panose="02000000000000000000" pitchFamily="2" charset="0"/>
-              </a:rPr>
-              <a:t> </a:t>
-            </a:r>
-          </a:p>
-          <a:p>
-            <a:pPr marL="0" indent="0">
-              <a:lnSpc>
-                <a:spcPct val="110000"/>
-              </a:lnSpc>
-              <a:buNone/>
-            </a:pPr>
-            <a:endParaRPr lang="en-US" b="1" dirty="0" smtClean="0">
-              <a:latin typeface="Roboto" panose="02000000000000000000" pitchFamily="2" charset="0"/>
-              <a:ea typeface="Roboto" panose="02000000000000000000" pitchFamily="2" charset="0"/>
-              <a:cs typeface="Roboto" panose="02000000000000000000" pitchFamily="2" charset="0"/>
-            </a:endParaRPr>
-          </a:p>
-          <a:p>
-            <a:pPr marL="0" indent="0">
-              <a:lnSpc>
-                <a:spcPct val="110000"/>
-              </a:lnSpc>
-              <a:buNone/>
-            </a:pPr>
-            <a:endParaRPr lang="en-US" dirty="0">
-              <a:latin typeface="+mn-lt"/>
-              <a:ea typeface="Roboto" panose="02000000000000000000" pitchFamily="2" charset="0"/>
-              <a:cs typeface="Roboto" panose="02000000000000000000" pitchFamily="2" charset="0"/>
-            </a:endParaRPr>
-          </a:p>
-          <a:p>
-            <a:pPr marL="0" indent="0">
-              <a:lnSpc>
-                <a:spcPct val="110000"/>
-              </a:lnSpc>
-              <a:buNone/>
-            </a:pPr>
-            <a:r>
-              <a:rPr lang="en-US" b="1" dirty="0" smtClean="0">
-                <a:latin typeface="Roboto" panose="02000000000000000000" pitchFamily="2" charset="0"/>
-                <a:ea typeface="Roboto" panose="02000000000000000000" pitchFamily="2" charset="0"/>
-                <a:cs typeface="Roboto" panose="02000000000000000000" pitchFamily="2" charset="0"/>
-              </a:rPr>
-              <a:t>      </a:t>
-            </a:r>
-          </a:p>
-        </p:txBody>
-      </p:sp>
-      <p:sp>
-        <p:nvSpPr>
-          <p:cNvPr id="3" name="Datumsplatzhalter 2"/>
-          <p:cNvSpPr>
-            <a:spLocks noGrp="1"/>
-          </p:cNvSpPr>
-          <p:nvPr>
-            <p:ph type="dt" sz="half" idx="10"/>
-          </p:nvPr>
-        </p:nvSpPr>
-        <p:spPr/>
-        <p:txBody>
-          <a:bodyPr/>
-          <a:lstStyle/>
-          <a:p>
-            <a:fld id="{22DC5AD6-A57E-4A83-84DC-685C8F7A0281}" type="datetime4">
-              <a:rPr lang="en-US" smtClean="0"/>
-              <a:t>August 6, 2021</a:t>
-            </a:fld>
-            <a:endParaRPr lang="de-DE" dirty="0"/>
-          </a:p>
-        </p:txBody>
-      </p:sp>
-      <p:sp>
-        <p:nvSpPr>
-          <p:cNvPr id="4" name="Fußzeilenplatzhalter 3"/>
-          <p:cNvSpPr>
-            <a:spLocks noGrp="1"/>
-          </p:cNvSpPr>
-          <p:nvPr>
-            <p:ph type="ftr" sz="quarter" idx="11"/>
-          </p:nvPr>
-        </p:nvSpPr>
-        <p:spPr/>
-        <p:txBody>
-          <a:bodyPr/>
-          <a:lstStyle/>
-          <a:p>
-            <a:r>
-              <a:rPr lang="de-DE" smtClean="0"/>
-              <a:t>Reiner Lemoine Institut</a:t>
-            </a:r>
-            <a:endParaRPr lang="de-DE" dirty="0"/>
-          </a:p>
-        </p:txBody>
-      </p:sp>
-      <p:sp>
-        <p:nvSpPr>
-          <p:cNvPr id="5" name="Foliennummernplatzhalter 4"/>
-          <p:cNvSpPr>
-            <a:spLocks noGrp="1"/>
-          </p:cNvSpPr>
-          <p:nvPr>
-            <p:ph type="sldNum" sz="quarter" idx="12"/>
-          </p:nvPr>
-        </p:nvSpPr>
-        <p:spPr/>
-        <p:txBody>
-          <a:bodyPr/>
-          <a:lstStyle/>
-          <a:p>
-            <a:fld id="{C2A96E4E-EC3F-424D-8211-F17AF9FC0446}" type="slidenum">
-              <a:rPr lang="de-DE" smtClean="0"/>
-              <a:pPr/>
-              <a:t>8</a:t>
-            </a:fld>
-            <a:endParaRPr lang="de-DE" dirty="0"/>
-          </a:p>
-        </p:txBody>
-      </p:sp>
-      <p:sp>
-        <p:nvSpPr>
-          <p:cNvPr id="6" name="Titel 5"/>
-          <p:cNvSpPr>
-            <a:spLocks noGrp="1"/>
-          </p:cNvSpPr>
-          <p:nvPr>
-            <p:ph type="title"/>
-          </p:nvPr>
-        </p:nvSpPr>
-        <p:spPr/>
-        <p:txBody>
-          <a:bodyPr/>
-          <a:lstStyle/>
-          <a:p>
-            <a:r>
-              <a:rPr lang="de-DE" dirty="0" smtClean="0"/>
-              <a:t>Programmieren</a:t>
-            </a:r>
-            <a:endParaRPr lang="de-DE" dirty="0"/>
-          </a:p>
-        </p:txBody>
-      </p:sp>
-    </p:spTree>
-    <p:extLst>
-      <p:ext uri="{BB962C8B-B14F-4D97-AF65-F5344CB8AC3E}">
-        <p14:creationId xmlns:p14="http://schemas.microsoft.com/office/powerpoint/2010/main" val="3461391536"/>
       </p:ext>
     </p:extLst>
   </p:cSld>

</xml_diff>